<commit_message>
added the docker slide and portion of the script
</commit_message>
<xml_diff>
--- a/Presentation.pptx
+++ b/Presentation.pptx
@@ -6277,7 +6277,49 @@
           <a:bodyPr/>
           <a:lstStyle/>
           <a:p>
-            <a:endParaRPr lang="en-GB"/>
+            <a:r>
+              <a:rPr lang="en-GB" dirty="0"/>
+              <a:t>Container management software.</a:t>
+            </a:r>
+          </a:p>
+          <a:p>
+            <a:endParaRPr lang="en-GB" dirty="0"/>
+          </a:p>
+          <a:p>
+            <a:r>
+              <a:rPr lang="en-GB" dirty="0"/>
+              <a:t>Used to create images, and containers.</a:t>
+            </a:r>
+          </a:p>
+          <a:p>
+            <a:endParaRPr lang="en-GB" dirty="0"/>
+          </a:p>
+          <a:p>
+            <a:r>
+              <a:rPr lang="en-GB" dirty="0"/>
+              <a:t>Uses </a:t>
+            </a:r>
+            <a:r>
+              <a:rPr lang="en-GB" dirty="0" err="1"/>
+              <a:t>dockerfiles</a:t>
+            </a:r>
+            <a:r>
+              <a:rPr lang="en-GB" dirty="0"/>
+              <a:t> to automate this</a:t>
+            </a:r>
+          </a:p>
+          <a:p>
+            <a:endParaRPr lang="en-GB" dirty="0"/>
+          </a:p>
+          <a:p>
+            <a:r>
+              <a:rPr lang="en-GB" dirty="0"/>
+              <a:t>We’ve used Docker to create and </a:t>
+            </a:r>
+            <a:r>
+              <a:rPr lang="en-GB"/>
+              <a:t>use images.</a:t>
+            </a:r>
           </a:p>
         </p:txBody>
       </p:sp>

</xml_diff>

<commit_message>
added the docker swarm powerpoint page and script
</commit_message>
<xml_diff>
--- a/Presentation.pptx
+++ b/Presentation.pptx
@@ -6314,11 +6314,7 @@
           <a:p>
             <a:r>
               <a:rPr lang="en-GB" dirty="0"/>
-              <a:t>We’ve used Docker to create and </a:t>
-            </a:r>
-            <a:r>
-              <a:rPr lang="en-GB"/>
-              <a:t>use images.</a:t>
+              <a:t>We’ve used Docker to create and use images.</a:t>
             </a:r>
           </a:p>
         </p:txBody>
@@ -6402,7 +6398,33 @@
           <a:bodyPr/>
           <a:lstStyle/>
           <a:p>
-            <a:endParaRPr lang="en-GB"/>
+            <a:r>
+              <a:rPr lang="en-GB" dirty="0"/>
+              <a:t>Docker swarm allows for multiple containers across multiple hosts.</a:t>
+            </a:r>
+          </a:p>
+          <a:p>
+            <a:endParaRPr lang="en-GB" dirty="0"/>
+          </a:p>
+          <a:p>
+            <a:r>
+              <a:rPr lang="en-GB" dirty="0"/>
+              <a:t>Means that rolling updates can </a:t>
+            </a:r>
+            <a:r>
+              <a:rPr lang="en-GB"/>
+              <a:t>be applied.</a:t>
+            </a:r>
+            <a:endParaRPr lang="en-GB" dirty="0"/>
+          </a:p>
+          <a:p>
+            <a:endParaRPr lang="en-GB" dirty="0"/>
+          </a:p>
+          <a:p>
+            <a:r>
+              <a:rPr lang="en-GB" dirty="0"/>
+              <a:t>We have used it for that purpose.</a:t>
+            </a:r>
           </a:p>
         </p:txBody>
       </p:sp>

</xml_diff>

<commit_message>
added the nginx powerpoint page and script
</commit_message>
<xml_diff>
--- a/Presentation.pptx
+++ b/Presentation.pptx
@@ -6409,13 +6409,8 @@
           <a:p>
             <a:r>
               <a:rPr lang="en-GB" dirty="0"/>
-              <a:t>Means that rolling updates can </a:t>
-            </a:r>
-            <a:r>
-              <a:rPr lang="en-GB"/>
-              <a:t>be applied.</a:t>
-            </a:r>
-            <a:endParaRPr lang="en-GB" dirty="0"/>
+              <a:t>Means that rolling updates can be applied.</a:t>
+            </a:r>
           </a:p>
           <a:p>
             <a:endParaRPr lang="en-GB" dirty="0"/>
@@ -6507,7 +6502,42 @@
           <a:bodyPr/>
           <a:lstStyle/>
           <a:p>
-            <a:endParaRPr lang="en-GB"/>
+            <a:r>
+              <a:rPr lang="en-GB" dirty="0"/>
+              <a:t>Used for:</a:t>
+            </a:r>
+          </a:p>
+          <a:p>
+            <a:pPr lvl="1"/>
+            <a:r>
+              <a:rPr lang="en-GB" dirty="0"/>
+              <a:t>Web serving</a:t>
+            </a:r>
+          </a:p>
+          <a:p>
+            <a:pPr lvl="1"/>
+            <a:r>
+              <a:rPr lang="en-GB" dirty="0"/>
+              <a:t>Reverse proxying</a:t>
+            </a:r>
+          </a:p>
+          <a:p>
+            <a:pPr lvl="1"/>
+            <a:r>
+              <a:rPr lang="en-GB" dirty="0"/>
+              <a:t>Caching</a:t>
+            </a:r>
+          </a:p>
+          <a:p>
+            <a:pPr lvl="1"/>
+            <a:r>
+              <a:rPr lang="en-GB" dirty="0"/>
+              <a:t>Load balancing</a:t>
+            </a:r>
+          </a:p>
+          <a:p>
+            <a:pPr lvl="1"/>
+            <a:endParaRPr lang="en-GB" dirty="0"/>
           </a:p>
         </p:txBody>
       </p:sp>

</xml_diff>

<commit_message>
completed the risk assessment slide and script
</commit_message>
<xml_diff>
--- a/Presentation.pptx
+++ b/Presentation.pptx
@@ -138,6 +138,9 @@
         </p14:section>
       </p14:sectionLst>
     </p:ext>
+    <p:ext uri="{EFAFB233-063F-42B5-8137-9DF3F51BA10A}">
+      <p15:sldGuideLst xmlns:p15="http://schemas.microsoft.com/office/powerpoint/2012/main"/>
+    </p:ext>
   </p:extLst>
 </p:presentation>
 </file>
@@ -328,7 +331,7 @@
           <a:p>
             <a:fld id="{1C13D257-CE01-4EC2-AF94-9C07AE21844F}" type="datetimeFigureOut">
               <a:rPr lang="en-GB" smtClean="0"/>
-              <a:t>18/01/2022</a:t>
+              <a:t>19/01/2022</a:t>
             </a:fld>
             <a:endParaRPr lang="en-GB"/>
           </a:p>
@@ -603,7 +606,7 @@
           <a:p>
             <a:fld id="{1C13D257-CE01-4EC2-AF94-9C07AE21844F}" type="datetimeFigureOut">
               <a:rPr lang="en-GB" smtClean="0"/>
-              <a:t>18/01/2022</a:t>
+              <a:t>19/01/2022</a:t>
             </a:fld>
             <a:endParaRPr lang="en-GB"/>
           </a:p>
@@ -797,7 +800,7 @@
           <a:p>
             <a:fld id="{1C13D257-CE01-4EC2-AF94-9C07AE21844F}" type="datetimeFigureOut">
               <a:rPr lang="en-GB" smtClean="0"/>
-              <a:t>18/01/2022</a:t>
+              <a:t>19/01/2022</a:t>
             </a:fld>
             <a:endParaRPr lang="en-GB"/>
           </a:p>
@@ -1070,7 +1073,7 @@
           <a:p>
             <a:fld id="{1C13D257-CE01-4EC2-AF94-9C07AE21844F}" type="datetimeFigureOut">
               <a:rPr lang="en-GB" smtClean="0"/>
-              <a:t>18/01/2022</a:t>
+              <a:t>19/01/2022</a:t>
             </a:fld>
             <a:endParaRPr lang="en-GB"/>
           </a:p>
@@ -1411,7 +1414,7 @@
           <a:p>
             <a:fld id="{1C13D257-CE01-4EC2-AF94-9C07AE21844F}" type="datetimeFigureOut">
               <a:rPr lang="en-GB" smtClean="0"/>
-              <a:t>18/01/2022</a:t>
+              <a:t>19/01/2022</a:t>
             </a:fld>
             <a:endParaRPr lang="en-GB"/>
           </a:p>
@@ -2034,7 +2037,7 @@
           <a:p>
             <a:fld id="{1C13D257-CE01-4EC2-AF94-9C07AE21844F}" type="datetimeFigureOut">
               <a:rPr lang="en-GB" smtClean="0"/>
-              <a:t>18/01/2022</a:t>
+              <a:t>19/01/2022</a:t>
             </a:fld>
             <a:endParaRPr lang="en-GB"/>
           </a:p>
@@ -2894,7 +2897,7 @@
           <a:p>
             <a:fld id="{1C13D257-CE01-4EC2-AF94-9C07AE21844F}" type="datetimeFigureOut">
               <a:rPr lang="en-GB" smtClean="0"/>
-              <a:t>18/01/2022</a:t>
+              <a:t>19/01/2022</a:t>
             </a:fld>
             <a:endParaRPr lang="en-GB"/>
           </a:p>
@@ -3064,7 +3067,7 @@
           <a:p>
             <a:fld id="{1C13D257-CE01-4EC2-AF94-9C07AE21844F}" type="datetimeFigureOut">
               <a:rPr lang="en-GB" smtClean="0"/>
-              <a:t>18/01/2022</a:t>
+              <a:t>19/01/2022</a:t>
             </a:fld>
             <a:endParaRPr lang="en-GB"/>
           </a:p>
@@ -3244,7 +3247,7 @@
           <a:p>
             <a:fld id="{1C13D257-CE01-4EC2-AF94-9C07AE21844F}" type="datetimeFigureOut">
               <a:rPr lang="en-GB" smtClean="0"/>
-              <a:t>18/01/2022</a:t>
+              <a:t>19/01/2022</a:t>
             </a:fld>
             <a:endParaRPr lang="en-GB"/>
           </a:p>
@@ -3414,7 +3417,7 @@
           <a:p>
             <a:fld id="{1C13D257-CE01-4EC2-AF94-9C07AE21844F}" type="datetimeFigureOut">
               <a:rPr lang="en-GB" smtClean="0"/>
-              <a:t>18/01/2022</a:t>
+              <a:t>19/01/2022</a:t>
             </a:fld>
             <a:endParaRPr lang="en-GB"/>
           </a:p>
@@ -3661,7 +3664,7 @@
           <a:p>
             <a:fld id="{1C13D257-CE01-4EC2-AF94-9C07AE21844F}" type="datetimeFigureOut">
               <a:rPr lang="en-GB" smtClean="0"/>
-              <a:t>18/01/2022</a:t>
+              <a:t>19/01/2022</a:t>
             </a:fld>
             <a:endParaRPr lang="en-GB"/>
           </a:p>
@@ -3953,7 +3956,7 @@
           <a:p>
             <a:fld id="{1C13D257-CE01-4EC2-AF94-9C07AE21844F}" type="datetimeFigureOut">
               <a:rPr lang="en-GB" smtClean="0"/>
-              <a:t>18/01/2022</a:t>
+              <a:t>19/01/2022</a:t>
             </a:fld>
             <a:endParaRPr lang="en-GB"/>
           </a:p>
@@ -4397,7 +4400,7 @@
           <a:p>
             <a:fld id="{1C13D257-CE01-4EC2-AF94-9C07AE21844F}" type="datetimeFigureOut">
               <a:rPr lang="en-GB" smtClean="0"/>
-              <a:t>18/01/2022</a:t>
+              <a:t>19/01/2022</a:t>
             </a:fld>
             <a:endParaRPr lang="en-GB"/>
           </a:p>
@@ -4515,7 +4518,7 @@
           <a:p>
             <a:fld id="{1C13D257-CE01-4EC2-AF94-9C07AE21844F}" type="datetimeFigureOut">
               <a:rPr lang="en-GB" smtClean="0"/>
-              <a:t>18/01/2022</a:t>
+              <a:t>19/01/2022</a:t>
             </a:fld>
             <a:endParaRPr lang="en-GB"/>
           </a:p>
@@ -4610,7 +4613,7 @@
           <a:p>
             <a:fld id="{1C13D257-CE01-4EC2-AF94-9C07AE21844F}" type="datetimeFigureOut">
               <a:rPr lang="en-GB" smtClean="0"/>
-              <a:t>18/01/2022</a:t>
+              <a:t>19/01/2022</a:t>
             </a:fld>
             <a:endParaRPr lang="en-GB"/>
           </a:p>
@@ -4889,7 +4892,7 @@
           <a:p>
             <a:fld id="{1C13D257-CE01-4EC2-AF94-9C07AE21844F}" type="datetimeFigureOut">
               <a:rPr lang="en-GB" smtClean="0"/>
-              <a:t>18/01/2022</a:t>
+              <a:t>19/01/2022</a:t>
             </a:fld>
             <a:endParaRPr lang="en-GB"/>
           </a:p>
@@ -5164,7 +5167,7 @@
           <a:p>
             <a:fld id="{1C13D257-CE01-4EC2-AF94-9C07AE21844F}" type="datetimeFigureOut">
               <a:rPr lang="en-GB" smtClean="0"/>
-              <a:t>18/01/2022</a:t>
+              <a:t>19/01/2022</a:t>
             </a:fld>
             <a:endParaRPr lang="en-GB"/>
           </a:p>
@@ -5593,7 +5596,7 @@
           <a:p>
             <a:fld id="{1C13D257-CE01-4EC2-AF94-9C07AE21844F}" type="datetimeFigureOut">
               <a:rPr lang="en-GB" smtClean="0"/>
-              <a:t>18/01/2022</a:t>
+              <a:t>19/01/2022</a:t>
             </a:fld>
             <a:endParaRPr lang="en-GB"/>
           </a:p>
@@ -6705,8 +6708,43 @@
           <a:p>
             <a:r>
               <a:rPr lang="en-GB" dirty="0"/>
-              <a:t>Lack of knowledge on the application language</a:t>
-            </a:r>
+              <a:t>Lack of knowledge on the application language.</a:t>
+            </a:r>
+          </a:p>
+          <a:p>
+            <a:endParaRPr lang="en-GB" dirty="0"/>
+          </a:p>
+          <a:p>
+            <a:r>
+              <a:rPr lang="en-GB" dirty="0"/>
+              <a:t>Scope</a:t>
+            </a:r>
+          </a:p>
+          <a:p>
+            <a:pPr lvl="1"/>
+            <a:r>
+              <a:rPr lang="en-GB" dirty="0"/>
+              <a:t>MVP</a:t>
+            </a:r>
+          </a:p>
+          <a:p>
+            <a:endParaRPr lang="en-GB" dirty="0"/>
+          </a:p>
+          <a:p>
+            <a:r>
+              <a:rPr lang="en-GB" dirty="0"/>
+              <a:t>CSRF Attacks</a:t>
+            </a:r>
+          </a:p>
+          <a:p>
+            <a:endParaRPr lang="en-GB" dirty="0"/>
+          </a:p>
+          <a:p>
+            <a:r>
+              <a:rPr lang="en-GB"/>
+              <a:t>DDOS Attacks</a:t>
+            </a:r>
+            <a:endParaRPr lang="en-GB" dirty="0"/>
           </a:p>
         </p:txBody>
       </p:sp>

</xml_diff>

<commit_message>
added the terraform slide and script, completing the presentation.
</commit_message>
<xml_diff>
--- a/Presentation.pptx
+++ b/Presentation.pptx
@@ -8,16 +8,14 @@
     <p:sldId id="256" r:id="rId2"/>
     <p:sldId id="257" r:id="rId3"/>
     <p:sldId id="269" r:id="rId4"/>
-    <p:sldId id="258" r:id="rId5"/>
-    <p:sldId id="260" r:id="rId6"/>
-    <p:sldId id="261" r:id="rId7"/>
-    <p:sldId id="262" r:id="rId8"/>
-    <p:sldId id="263" r:id="rId9"/>
-    <p:sldId id="264" r:id="rId10"/>
-    <p:sldId id="265" r:id="rId11"/>
-    <p:sldId id="266" r:id="rId12"/>
-    <p:sldId id="268" r:id="rId13"/>
-    <p:sldId id="267" r:id="rId14"/>
+    <p:sldId id="261" r:id="rId5"/>
+    <p:sldId id="262" r:id="rId6"/>
+    <p:sldId id="263" r:id="rId7"/>
+    <p:sldId id="264" r:id="rId8"/>
+    <p:sldId id="265" r:id="rId9"/>
+    <p:sldId id="266" r:id="rId10"/>
+    <p:sldId id="268" r:id="rId11"/>
+    <p:sldId id="267" r:id="rId12"/>
   </p:sldIdLst>
   <p:sldSz cx="12192000" cy="6858000"/>
   <p:notesSz cx="6858000" cy="9144000"/>
@@ -124,8 +122,6 @@
             <p14:sldId id="256"/>
             <p14:sldId id="257"/>
             <p14:sldId id="269"/>
-            <p14:sldId id="258"/>
-            <p14:sldId id="260"/>
             <p14:sldId id="261"/>
             <p14:sldId id="262"/>
             <p14:sldId id="263"/>
@@ -331,7 +327,7 @@
           <a:p>
             <a:fld id="{1C13D257-CE01-4EC2-AF94-9C07AE21844F}" type="datetimeFigureOut">
               <a:rPr lang="en-GB" smtClean="0"/>
-              <a:t>19/01/2022</a:t>
+              <a:t>20/01/2022</a:t>
             </a:fld>
             <a:endParaRPr lang="en-GB"/>
           </a:p>
@@ -606,7 +602,7 @@
           <a:p>
             <a:fld id="{1C13D257-CE01-4EC2-AF94-9C07AE21844F}" type="datetimeFigureOut">
               <a:rPr lang="en-GB" smtClean="0"/>
-              <a:t>19/01/2022</a:t>
+              <a:t>20/01/2022</a:t>
             </a:fld>
             <a:endParaRPr lang="en-GB"/>
           </a:p>
@@ -800,7 +796,7 @@
           <a:p>
             <a:fld id="{1C13D257-CE01-4EC2-AF94-9C07AE21844F}" type="datetimeFigureOut">
               <a:rPr lang="en-GB" smtClean="0"/>
-              <a:t>19/01/2022</a:t>
+              <a:t>20/01/2022</a:t>
             </a:fld>
             <a:endParaRPr lang="en-GB"/>
           </a:p>
@@ -1073,7 +1069,7 @@
           <a:p>
             <a:fld id="{1C13D257-CE01-4EC2-AF94-9C07AE21844F}" type="datetimeFigureOut">
               <a:rPr lang="en-GB" smtClean="0"/>
-              <a:t>19/01/2022</a:t>
+              <a:t>20/01/2022</a:t>
             </a:fld>
             <a:endParaRPr lang="en-GB"/>
           </a:p>
@@ -1414,7 +1410,7 @@
           <a:p>
             <a:fld id="{1C13D257-CE01-4EC2-AF94-9C07AE21844F}" type="datetimeFigureOut">
               <a:rPr lang="en-GB" smtClean="0"/>
-              <a:t>19/01/2022</a:t>
+              <a:t>20/01/2022</a:t>
             </a:fld>
             <a:endParaRPr lang="en-GB"/>
           </a:p>
@@ -2037,7 +2033,7 @@
           <a:p>
             <a:fld id="{1C13D257-CE01-4EC2-AF94-9C07AE21844F}" type="datetimeFigureOut">
               <a:rPr lang="en-GB" smtClean="0"/>
-              <a:t>19/01/2022</a:t>
+              <a:t>20/01/2022</a:t>
             </a:fld>
             <a:endParaRPr lang="en-GB"/>
           </a:p>
@@ -2897,7 +2893,7 @@
           <a:p>
             <a:fld id="{1C13D257-CE01-4EC2-AF94-9C07AE21844F}" type="datetimeFigureOut">
               <a:rPr lang="en-GB" smtClean="0"/>
-              <a:t>19/01/2022</a:t>
+              <a:t>20/01/2022</a:t>
             </a:fld>
             <a:endParaRPr lang="en-GB"/>
           </a:p>
@@ -3067,7 +3063,7 @@
           <a:p>
             <a:fld id="{1C13D257-CE01-4EC2-AF94-9C07AE21844F}" type="datetimeFigureOut">
               <a:rPr lang="en-GB" smtClean="0"/>
-              <a:t>19/01/2022</a:t>
+              <a:t>20/01/2022</a:t>
             </a:fld>
             <a:endParaRPr lang="en-GB"/>
           </a:p>
@@ -3247,7 +3243,7 @@
           <a:p>
             <a:fld id="{1C13D257-CE01-4EC2-AF94-9C07AE21844F}" type="datetimeFigureOut">
               <a:rPr lang="en-GB" smtClean="0"/>
-              <a:t>19/01/2022</a:t>
+              <a:t>20/01/2022</a:t>
             </a:fld>
             <a:endParaRPr lang="en-GB"/>
           </a:p>
@@ -3417,7 +3413,7 @@
           <a:p>
             <a:fld id="{1C13D257-CE01-4EC2-AF94-9C07AE21844F}" type="datetimeFigureOut">
               <a:rPr lang="en-GB" smtClean="0"/>
-              <a:t>19/01/2022</a:t>
+              <a:t>20/01/2022</a:t>
             </a:fld>
             <a:endParaRPr lang="en-GB"/>
           </a:p>
@@ -3664,7 +3660,7 @@
           <a:p>
             <a:fld id="{1C13D257-CE01-4EC2-AF94-9C07AE21844F}" type="datetimeFigureOut">
               <a:rPr lang="en-GB" smtClean="0"/>
-              <a:t>19/01/2022</a:t>
+              <a:t>20/01/2022</a:t>
             </a:fld>
             <a:endParaRPr lang="en-GB"/>
           </a:p>
@@ -3956,7 +3952,7 @@
           <a:p>
             <a:fld id="{1C13D257-CE01-4EC2-AF94-9C07AE21844F}" type="datetimeFigureOut">
               <a:rPr lang="en-GB" smtClean="0"/>
-              <a:t>19/01/2022</a:t>
+              <a:t>20/01/2022</a:t>
             </a:fld>
             <a:endParaRPr lang="en-GB"/>
           </a:p>
@@ -4400,7 +4396,7 @@
           <a:p>
             <a:fld id="{1C13D257-CE01-4EC2-AF94-9C07AE21844F}" type="datetimeFigureOut">
               <a:rPr lang="en-GB" smtClean="0"/>
-              <a:t>19/01/2022</a:t>
+              <a:t>20/01/2022</a:t>
             </a:fld>
             <a:endParaRPr lang="en-GB"/>
           </a:p>
@@ -4518,7 +4514,7 @@
           <a:p>
             <a:fld id="{1C13D257-CE01-4EC2-AF94-9C07AE21844F}" type="datetimeFigureOut">
               <a:rPr lang="en-GB" smtClean="0"/>
-              <a:t>19/01/2022</a:t>
+              <a:t>20/01/2022</a:t>
             </a:fld>
             <a:endParaRPr lang="en-GB"/>
           </a:p>
@@ -4613,7 +4609,7 @@
           <a:p>
             <a:fld id="{1C13D257-CE01-4EC2-AF94-9C07AE21844F}" type="datetimeFigureOut">
               <a:rPr lang="en-GB" smtClean="0"/>
-              <a:t>19/01/2022</a:t>
+              <a:t>20/01/2022</a:t>
             </a:fld>
             <a:endParaRPr lang="en-GB"/>
           </a:p>
@@ -4892,7 +4888,7 @@
           <a:p>
             <a:fld id="{1C13D257-CE01-4EC2-AF94-9C07AE21844F}" type="datetimeFigureOut">
               <a:rPr lang="en-GB" smtClean="0"/>
-              <a:t>19/01/2022</a:t>
+              <a:t>20/01/2022</a:t>
             </a:fld>
             <a:endParaRPr lang="en-GB"/>
           </a:p>
@@ -5167,7 +5163,7 @@
           <a:p>
             <a:fld id="{1C13D257-CE01-4EC2-AF94-9C07AE21844F}" type="datetimeFigureOut">
               <a:rPr lang="en-GB" smtClean="0"/>
-              <a:t>19/01/2022</a:t>
+              <a:t>20/01/2022</a:t>
             </a:fld>
             <a:endParaRPr lang="en-GB"/>
           </a:p>
@@ -5596,7 +5592,7 @@
           <a:p>
             <a:fld id="{1C13D257-CE01-4EC2-AF94-9C07AE21844F}" type="datetimeFigureOut">
               <a:rPr lang="en-GB" smtClean="0"/>
-              <a:t>19/01/2022</a:t>
+              <a:t>20/01/2022</a:t>
             </a:fld>
             <a:endParaRPr lang="en-GB"/>
           </a:p>
@@ -6236,231 +6232,6 @@
           <p:cNvPr id="2" name="Title 1">
             <a:extLst>
               <a:ext uri="{FF2B5EF4-FFF2-40B4-BE49-F238E27FC236}">
-                <a16:creationId xmlns:a16="http://schemas.microsoft.com/office/drawing/2014/main" id="{62171CD2-55A0-451A-A0C4-260D0D7ABF93}"/>
-              </a:ext>
-            </a:extLst>
-          </p:cNvPr>
-          <p:cNvSpPr>
-            <a:spLocks noGrp="1"/>
-          </p:cNvSpPr>
-          <p:nvPr>
-            <p:ph type="title"/>
-          </p:nvPr>
-        </p:nvSpPr>
-        <p:spPr/>
-        <p:txBody>
-          <a:bodyPr/>
-          <a:lstStyle/>
-          <a:p>
-            <a:r>
-              <a:rPr lang="en-GB" dirty="0"/>
-              <a:t>Docker</a:t>
-            </a:r>
-          </a:p>
-        </p:txBody>
-      </p:sp>
-      <p:sp>
-        <p:nvSpPr>
-          <p:cNvPr id="3" name="Content Placeholder 2">
-            <a:extLst>
-              <a:ext uri="{FF2B5EF4-FFF2-40B4-BE49-F238E27FC236}">
-                <a16:creationId xmlns:a16="http://schemas.microsoft.com/office/drawing/2014/main" id="{4524D04E-5135-4276-AC66-00852B84FEE3}"/>
-              </a:ext>
-            </a:extLst>
-          </p:cNvPr>
-          <p:cNvSpPr>
-            <a:spLocks noGrp="1"/>
-          </p:cNvSpPr>
-          <p:nvPr>
-            <p:ph idx="1"/>
-          </p:nvPr>
-        </p:nvSpPr>
-        <p:spPr/>
-        <p:txBody>
-          <a:bodyPr/>
-          <a:lstStyle/>
-          <a:p>
-            <a:r>
-              <a:rPr lang="en-GB" dirty="0"/>
-              <a:t>Container management software.</a:t>
-            </a:r>
-          </a:p>
-          <a:p>
-            <a:endParaRPr lang="en-GB" dirty="0"/>
-          </a:p>
-          <a:p>
-            <a:r>
-              <a:rPr lang="en-GB" dirty="0"/>
-              <a:t>Used to create images, and containers.</a:t>
-            </a:r>
-          </a:p>
-          <a:p>
-            <a:endParaRPr lang="en-GB" dirty="0"/>
-          </a:p>
-          <a:p>
-            <a:r>
-              <a:rPr lang="en-GB" dirty="0"/>
-              <a:t>Uses </a:t>
-            </a:r>
-            <a:r>
-              <a:rPr lang="en-GB" dirty="0" err="1"/>
-              <a:t>dockerfiles</a:t>
-            </a:r>
-            <a:r>
-              <a:rPr lang="en-GB" dirty="0"/>
-              <a:t> to automate this</a:t>
-            </a:r>
-          </a:p>
-          <a:p>
-            <a:endParaRPr lang="en-GB" dirty="0"/>
-          </a:p>
-          <a:p>
-            <a:r>
-              <a:rPr lang="en-GB" dirty="0"/>
-              <a:t>We’ve used Docker to create and use images.</a:t>
-            </a:r>
-          </a:p>
-        </p:txBody>
-      </p:sp>
-    </p:spTree>
-    <p:extLst>
-      <p:ext uri="{BB962C8B-B14F-4D97-AF65-F5344CB8AC3E}">
-        <p14:creationId xmlns:p14="http://schemas.microsoft.com/office/powerpoint/2010/main" val="906818953"/>
-      </p:ext>
-    </p:extLst>
-  </p:cSld>
-  <p:clrMapOvr>
-    <a:masterClrMapping/>
-  </p:clrMapOvr>
-</p:sld>
-</file>
-
-<file path=ppt/slides/slide11.xml><?xml version="1.0" encoding="utf-8"?>
-<p:sld xmlns:a="http://schemas.openxmlformats.org/drawingml/2006/main" xmlns:r="http://schemas.openxmlformats.org/officeDocument/2006/relationships" xmlns:p="http://schemas.openxmlformats.org/presentationml/2006/main">
-  <p:cSld>
-    <p:spTree>
-      <p:nvGrpSpPr>
-        <p:cNvPr id="1" name=""/>
-        <p:cNvGrpSpPr/>
-        <p:nvPr/>
-      </p:nvGrpSpPr>
-      <p:grpSpPr>
-        <a:xfrm>
-          <a:off x="0" y="0"/>
-          <a:ext cx="0" cy="0"/>
-          <a:chOff x="0" y="0"/>
-          <a:chExt cx="0" cy="0"/>
-        </a:xfrm>
-      </p:grpSpPr>
-      <p:sp>
-        <p:nvSpPr>
-          <p:cNvPr id="2" name="Title 1">
-            <a:extLst>
-              <a:ext uri="{FF2B5EF4-FFF2-40B4-BE49-F238E27FC236}">
-                <a16:creationId xmlns:a16="http://schemas.microsoft.com/office/drawing/2014/main" id="{6C390089-8495-41FB-82C9-CE1508830F4C}"/>
-              </a:ext>
-            </a:extLst>
-          </p:cNvPr>
-          <p:cNvSpPr>
-            <a:spLocks noGrp="1"/>
-          </p:cNvSpPr>
-          <p:nvPr>
-            <p:ph type="title"/>
-          </p:nvPr>
-        </p:nvSpPr>
-        <p:spPr/>
-        <p:txBody>
-          <a:bodyPr/>
-          <a:lstStyle/>
-          <a:p>
-            <a:r>
-              <a:rPr lang="en-GB" dirty="0"/>
-              <a:t>Docker Swarm</a:t>
-            </a:r>
-          </a:p>
-        </p:txBody>
-      </p:sp>
-      <p:sp>
-        <p:nvSpPr>
-          <p:cNvPr id="3" name="Content Placeholder 2">
-            <a:extLst>
-              <a:ext uri="{FF2B5EF4-FFF2-40B4-BE49-F238E27FC236}">
-                <a16:creationId xmlns:a16="http://schemas.microsoft.com/office/drawing/2014/main" id="{29FB5573-5E07-4080-B530-772B5BA80F8B}"/>
-              </a:ext>
-            </a:extLst>
-          </p:cNvPr>
-          <p:cNvSpPr>
-            <a:spLocks noGrp="1"/>
-          </p:cNvSpPr>
-          <p:nvPr>
-            <p:ph idx="1"/>
-          </p:nvPr>
-        </p:nvSpPr>
-        <p:spPr/>
-        <p:txBody>
-          <a:bodyPr/>
-          <a:lstStyle/>
-          <a:p>
-            <a:r>
-              <a:rPr lang="en-GB" dirty="0"/>
-              <a:t>Docker swarm allows for multiple containers across multiple hosts.</a:t>
-            </a:r>
-          </a:p>
-          <a:p>
-            <a:endParaRPr lang="en-GB" dirty="0"/>
-          </a:p>
-          <a:p>
-            <a:r>
-              <a:rPr lang="en-GB" dirty="0"/>
-              <a:t>Means that rolling updates can be applied.</a:t>
-            </a:r>
-          </a:p>
-          <a:p>
-            <a:endParaRPr lang="en-GB" dirty="0"/>
-          </a:p>
-          <a:p>
-            <a:r>
-              <a:rPr lang="en-GB" dirty="0"/>
-              <a:t>We have used it for that purpose.</a:t>
-            </a:r>
-          </a:p>
-        </p:txBody>
-      </p:sp>
-    </p:spTree>
-    <p:extLst>
-      <p:ext uri="{BB962C8B-B14F-4D97-AF65-F5344CB8AC3E}">
-        <p14:creationId xmlns:p14="http://schemas.microsoft.com/office/powerpoint/2010/main" val="1793294166"/>
-      </p:ext>
-    </p:extLst>
-  </p:cSld>
-  <p:clrMapOvr>
-    <a:masterClrMapping/>
-  </p:clrMapOvr>
-</p:sld>
-</file>
-
-<file path=ppt/slides/slide12.xml><?xml version="1.0" encoding="utf-8"?>
-<p:sld xmlns:a="http://schemas.openxmlformats.org/drawingml/2006/main" xmlns:r="http://schemas.openxmlformats.org/officeDocument/2006/relationships" xmlns:p="http://schemas.openxmlformats.org/presentationml/2006/main">
-  <p:cSld>
-    <p:spTree>
-      <p:nvGrpSpPr>
-        <p:cNvPr id="1" name=""/>
-        <p:cNvGrpSpPr/>
-        <p:nvPr/>
-      </p:nvGrpSpPr>
-      <p:grpSpPr>
-        <a:xfrm>
-          <a:off x="0" y="0"/>
-          <a:ext cx="0" cy="0"/>
-          <a:chOff x="0" y="0"/>
-          <a:chExt cx="0" cy="0"/>
-        </a:xfrm>
-      </p:grpSpPr>
-      <p:sp>
-        <p:nvSpPr>
-          <p:cNvPr id="2" name="Title 1">
-            <a:extLst>
-              <a:ext uri="{FF2B5EF4-FFF2-40B4-BE49-F238E27FC236}">
                 <a16:creationId xmlns:a16="http://schemas.microsoft.com/office/drawing/2014/main" id="{2F797ECE-8A43-4314-9A4F-51D8DBF73C90}"/>
               </a:ext>
             </a:extLst>
@@ -6557,7 +6328,7 @@
 </p:sld>
 </file>
 
-<file path=ppt/slides/slide13.xml><?xml version="1.0" encoding="utf-8"?>
+<file path=ppt/slides/slide11.xml><?xml version="1.0" encoding="utf-8"?>
 <p:sld xmlns:a="http://schemas.openxmlformats.org/drawingml/2006/main" xmlns:r="http://schemas.openxmlformats.org/officeDocument/2006/relationships" xmlns:p="http://schemas.openxmlformats.org/presentationml/2006/main">
   <p:cSld>
     <p:spTree>
@@ -6741,10 +6512,9 @@
           </a:p>
           <a:p>
             <a:r>
-              <a:rPr lang="en-GB"/>
+              <a:rPr lang="en-GB" dirty="0"/>
               <a:t>DDOS Attacks</a:t>
             </a:r>
-            <a:endParaRPr lang="en-GB" dirty="0"/>
           </a:p>
         </p:txBody>
       </p:sp>
@@ -6827,6 +6597,51 @@
           <a:bodyPr/>
           <a:lstStyle/>
           <a:p>
+            <a:r>
+              <a:rPr lang="en-GB" dirty="0"/>
+              <a:t>Deploying the software requires at least a t2.small vm.</a:t>
+            </a:r>
+          </a:p>
+          <a:p>
+            <a:endParaRPr lang="en-GB" dirty="0"/>
+          </a:p>
+          <a:p>
+            <a:r>
+              <a:rPr lang="en-GB" dirty="0"/>
+              <a:t>T2.small machine costs £0.017 an hour.</a:t>
+            </a:r>
+          </a:p>
+          <a:p>
+            <a:pPr lvl="1"/>
+            <a:r>
+              <a:rPr lang="en-GB" dirty="0"/>
+              <a:t>£0.41 a day.</a:t>
+            </a:r>
+          </a:p>
+          <a:p>
+            <a:pPr lvl="1"/>
+            <a:r>
+              <a:rPr lang="en-GB" dirty="0"/>
+              <a:t>Roughly £12.24 a month.</a:t>
+            </a:r>
+          </a:p>
+          <a:p>
+            <a:endParaRPr lang="en-GB" dirty="0"/>
+          </a:p>
+          <a:p>
+            <a:r>
+              <a:rPr lang="en-GB" dirty="0"/>
+              <a:t>We would require 4 machines to deploy the application</a:t>
+            </a:r>
+          </a:p>
+          <a:p>
+            <a:pPr lvl="1"/>
+            <a:r>
+              <a:rPr lang="en-GB" dirty="0"/>
+              <a:t>Total maximum cost - £48.96 a month.</a:t>
+            </a:r>
+          </a:p>
+          <a:p>
             <a:endParaRPr lang="en-GB" dirty="0"/>
           </a:p>
         </p:txBody>
@@ -6866,7 +6681,7 @@
           <p:cNvPr id="2" name="Title 1">
             <a:extLst>
               <a:ext uri="{FF2B5EF4-FFF2-40B4-BE49-F238E27FC236}">
-                <a16:creationId xmlns:a16="http://schemas.microsoft.com/office/drawing/2014/main" id="{58C21C74-2336-4129-9267-80789DB440E2}"/>
+                <a16:creationId xmlns:a16="http://schemas.microsoft.com/office/drawing/2014/main" id="{007D5C7D-D3CF-4C75-BCE1-A32655BA5B63}"/>
               </a:ext>
             </a:extLst>
           </p:cNvPr>
@@ -6884,7 +6699,7 @@
           <a:p>
             <a:r>
               <a:rPr lang="en-GB" dirty="0"/>
-              <a:t>Service Infrastructure</a:t>
+              <a:t>AWS</a:t>
             </a:r>
           </a:p>
         </p:txBody>
@@ -6894,7 +6709,7 @@
           <p:cNvPr id="3" name="Content Placeholder 2">
             <a:extLst>
               <a:ext uri="{FF2B5EF4-FFF2-40B4-BE49-F238E27FC236}">
-                <a16:creationId xmlns:a16="http://schemas.microsoft.com/office/drawing/2014/main" id="{28C4C8DE-0E92-4240-B4A1-3019F9F7EFB6}"/>
+                <a16:creationId xmlns:a16="http://schemas.microsoft.com/office/drawing/2014/main" id="{A0F61D77-A24C-4D43-8F9F-64C4E74C3D86}"/>
               </a:ext>
             </a:extLst>
           </p:cNvPr>
@@ -6910,14 +6725,35 @@
           <a:bodyPr/>
           <a:lstStyle/>
           <a:p>
-            <a:endParaRPr lang="en-GB"/>
+            <a:r>
+              <a:rPr lang="en-GB" dirty="0"/>
+              <a:t>We used AWS to host our virtual machines.</a:t>
+            </a:r>
+          </a:p>
+          <a:p>
+            <a:endParaRPr lang="en-GB" dirty="0"/>
+          </a:p>
+          <a:p>
+            <a:r>
+              <a:rPr lang="en-GB" dirty="0"/>
+              <a:t>We installed and got the application running manually first.</a:t>
+            </a:r>
+          </a:p>
+          <a:p>
+            <a:endParaRPr lang="en-GB" dirty="0"/>
+          </a:p>
+          <a:p>
+            <a:r>
+              <a:rPr lang="en-GB" dirty="0"/>
+              <a:t>Makes for a remote site to host that is accessible to all of the developers to work on.</a:t>
+            </a:r>
           </a:p>
         </p:txBody>
       </p:sp>
     </p:spTree>
     <p:extLst>
       <p:ext uri="{BB962C8B-B14F-4D97-AF65-F5344CB8AC3E}">
-        <p14:creationId xmlns:p14="http://schemas.microsoft.com/office/powerpoint/2010/main" val="2351963339"/>
+        <p14:creationId xmlns:p14="http://schemas.microsoft.com/office/powerpoint/2010/main" val="867930786"/>
       </p:ext>
     </p:extLst>
   </p:cSld>
@@ -6949,7 +6785,7 @@
           <p:cNvPr id="2" name="Title 1">
             <a:extLst>
               <a:ext uri="{FF2B5EF4-FFF2-40B4-BE49-F238E27FC236}">
-                <a16:creationId xmlns:a16="http://schemas.microsoft.com/office/drawing/2014/main" id="{54A541FD-B4EB-48C0-8D40-8C75DEA3D105}"/>
+                <a16:creationId xmlns:a16="http://schemas.microsoft.com/office/drawing/2014/main" id="{61F1532D-0793-4F84-A3FA-B3D6FCCA0FCA}"/>
               </a:ext>
             </a:extLst>
           </p:cNvPr>
@@ -6967,7 +6803,7 @@
           <a:p>
             <a:r>
               <a:rPr lang="en-GB" dirty="0"/>
-              <a:t>CI Pipeline</a:t>
+              <a:t>Jenkins Build</a:t>
             </a:r>
           </a:p>
         </p:txBody>
@@ -6977,7 +6813,7 @@
           <p:cNvPr id="3" name="Content Placeholder 2">
             <a:extLst>
               <a:ext uri="{FF2B5EF4-FFF2-40B4-BE49-F238E27FC236}">
-                <a16:creationId xmlns:a16="http://schemas.microsoft.com/office/drawing/2014/main" id="{8232913C-0D9D-434D-9433-066B273A9920}"/>
+                <a16:creationId xmlns:a16="http://schemas.microsoft.com/office/drawing/2014/main" id="{EE896E65-00CD-4AED-9E8D-D0940795475B}"/>
               </a:ext>
             </a:extLst>
           </p:cNvPr>
@@ -6993,14 +6829,41 @@
           <a:bodyPr/>
           <a:lstStyle/>
           <a:p>
-            <a:endParaRPr lang="en-GB"/>
+            <a:r>
+              <a:rPr lang="en-GB" dirty="0"/>
+              <a:t>Jenkins is used to automatically update the application.</a:t>
+            </a:r>
+          </a:p>
+          <a:p>
+            <a:endParaRPr lang="en-GB" dirty="0"/>
+          </a:p>
+          <a:p>
+            <a:r>
+              <a:rPr lang="en-GB" dirty="0"/>
+              <a:t>Updates when commits are made to the main branch.</a:t>
+            </a:r>
+          </a:p>
+          <a:p>
+            <a:endParaRPr lang="en-GB" dirty="0"/>
+          </a:p>
+          <a:p>
+            <a:r>
+              <a:rPr lang="en-GB" dirty="0"/>
+              <a:t>Easier deployment and version control.</a:t>
+            </a:r>
+          </a:p>
+          <a:p>
+            <a:endParaRPr lang="en-GB" dirty="0"/>
+          </a:p>
+          <a:p>
+            <a:endParaRPr lang="en-GB" dirty="0"/>
           </a:p>
         </p:txBody>
       </p:sp>
     </p:spTree>
     <p:extLst>
       <p:ext uri="{BB962C8B-B14F-4D97-AF65-F5344CB8AC3E}">
-        <p14:creationId xmlns:p14="http://schemas.microsoft.com/office/powerpoint/2010/main" val="1356481866"/>
+        <p14:creationId xmlns:p14="http://schemas.microsoft.com/office/powerpoint/2010/main" val="3446547663"/>
       </p:ext>
     </p:extLst>
   </p:cSld>
@@ -7032,7 +6895,7 @@
           <p:cNvPr id="2" name="Title 1">
             <a:extLst>
               <a:ext uri="{FF2B5EF4-FFF2-40B4-BE49-F238E27FC236}">
-                <a16:creationId xmlns:a16="http://schemas.microsoft.com/office/drawing/2014/main" id="{007D5C7D-D3CF-4C75-BCE1-A32655BA5B63}"/>
+                <a16:creationId xmlns:a16="http://schemas.microsoft.com/office/drawing/2014/main" id="{DE145FAA-0A8B-4223-92F0-99F6663BB194}"/>
               </a:ext>
             </a:extLst>
           </p:cNvPr>
@@ -7050,7 +6913,7 @@
           <a:p>
             <a:r>
               <a:rPr lang="en-GB" dirty="0"/>
-              <a:t>AWS</a:t>
+              <a:t>Ansible</a:t>
             </a:r>
           </a:p>
         </p:txBody>
@@ -7060,7 +6923,7 @@
           <p:cNvPr id="3" name="Content Placeholder 2">
             <a:extLst>
               <a:ext uri="{FF2B5EF4-FFF2-40B4-BE49-F238E27FC236}">
-                <a16:creationId xmlns:a16="http://schemas.microsoft.com/office/drawing/2014/main" id="{A0F61D77-A24C-4D43-8F9F-64C4E74C3D86}"/>
+                <a16:creationId xmlns:a16="http://schemas.microsoft.com/office/drawing/2014/main" id="{D1C250E1-E5E1-4EB7-8853-CCE96F445B0F}"/>
               </a:ext>
             </a:extLst>
           </p:cNvPr>
@@ -7078,7 +6941,7 @@
           <a:p>
             <a:r>
               <a:rPr lang="en-GB" dirty="0"/>
-              <a:t>We used AWS to host our virtual machines.</a:t>
+              <a:t>Used to automate work throughout the infrastructure.</a:t>
             </a:r>
           </a:p>
           <a:p>
@@ -7087,7 +6950,7 @@
           <a:p>
             <a:r>
               <a:rPr lang="en-GB" dirty="0"/>
-              <a:t>We installed and got the application running manually first.</a:t>
+              <a:t>Invaluable to a system admin.</a:t>
             </a:r>
           </a:p>
           <a:p>
@@ -7096,7 +6959,15 @@
           <a:p>
             <a:r>
               <a:rPr lang="en-GB" dirty="0"/>
-              <a:t>Makes for a remote site to host that is accessible to all of the developers to work on.</a:t>
+              <a:t>We specifically used the </a:t>
+            </a:r>
+            <a:r>
+              <a:rPr lang="en-GB" dirty="0" err="1"/>
+              <a:t>playbook.yaml</a:t>
+            </a:r>
+            <a:r>
+              <a:rPr lang="en-GB" dirty="0"/>
+              <a:t>.</a:t>
             </a:r>
           </a:p>
         </p:txBody>
@@ -7104,7 +6975,7 @@
     </p:spTree>
     <p:extLst>
       <p:ext uri="{BB962C8B-B14F-4D97-AF65-F5344CB8AC3E}">
-        <p14:creationId xmlns:p14="http://schemas.microsoft.com/office/powerpoint/2010/main" val="867930786"/>
+        <p14:creationId xmlns:p14="http://schemas.microsoft.com/office/powerpoint/2010/main" val="1427349912"/>
       </p:ext>
     </p:extLst>
   </p:cSld>
@@ -7136,7 +7007,7 @@
           <p:cNvPr id="2" name="Title 1">
             <a:extLst>
               <a:ext uri="{FF2B5EF4-FFF2-40B4-BE49-F238E27FC236}">
-                <a16:creationId xmlns:a16="http://schemas.microsoft.com/office/drawing/2014/main" id="{61F1532D-0793-4F84-A3FA-B3D6FCCA0FCA}"/>
+                <a16:creationId xmlns:a16="http://schemas.microsoft.com/office/drawing/2014/main" id="{B5BC447E-D230-4420-8BEB-3FE19BC90CB5}"/>
               </a:ext>
             </a:extLst>
           </p:cNvPr>
@@ -7154,7 +7025,7 @@
           <a:p>
             <a:r>
               <a:rPr lang="en-GB" dirty="0"/>
-              <a:t>Jenkins Build</a:t>
+              <a:t>Terraform</a:t>
             </a:r>
           </a:p>
         </p:txBody>
@@ -7164,7 +7035,7 @@
           <p:cNvPr id="3" name="Content Placeholder 2">
             <a:extLst>
               <a:ext uri="{FF2B5EF4-FFF2-40B4-BE49-F238E27FC236}">
-                <a16:creationId xmlns:a16="http://schemas.microsoft.com/office/drawing/2014/main" id="{EE896E65-00CD-4AED-9E8D-D0940795475B}"/>
+                <a16:creationId xmlns:a16="http://schemas.microsoft.com/office/drawing/2014/main" id="{8BE9E527-27DA-487C-86CF-AF9BF86C4DD1}"/>
               </a:ext>
             </a:extLst>
           </p:cNvPr>
@@ -7182,7 +7053,7 @@
           <a:p>
             <a:r>
               <a:rPr lang="en-GB" dirty="0"/>
-              <a:t>Jenkins is used to automatically update the application.</a:t>
+              <a:t>A tool to control infrastructure on a cloud service provider.</a:t>
             </a:r>
           </a:p>
           <a:p>
@@ -7191,7 +7062,7 @@
           <a:p>
             <a:r>
               <a:rPr lang="en-GB" dirty="0"/>
-              <a:t>Updates when commits are made to the main branch.</a:t>
+              <a:t>Means that environments will stay up to date.</a:t>
             </a:r>
           </a:p>
           <a:p>
@@ -7200,13 +7071,21 @@
           <a:p>
             <a:r>
               <a:rPr lang="en-GB" dirty="0"/>
-              <a:t>Easier deployment and version control.</a:t>
+              <a:t>Commonly used for; multi-tier applications, software demos, disposable environments and multi-cloud deployments.</a:t>
             </a:r>
           </a:p>
           <a:p>
             <a:endParaRPr lang="en-GB" dirty="0"/>
           </a:p>
           <a:p>
+            <a:r>
+              <a:rPr lang="en-GB" dirty="0"/>
+              <a:t>Used it to set up </a:t>
+            </a:r>
+            <a:r>
+              <a:rPr lang="en-GB"/>
+              <a:t>and configure our vms in AWS.</a:t>
+            </a:r>
             <a:endParaRPr lang="en-GB" dirty="0"/>
           </a:p>
         </p:txBody>
@@ -7214,7 +7093,7 @@
     </p:spTree>
     <p:extLst>
       <p:ext uri="{BB962C8B-B14F-4D97-AF65-F5344CB8AC3E}">
-        <p14:creationId xmlns:p14="http://schemas.microsoft.com/office/powerpoint/2010/main" val="3446547663"/>
+        <p14:creationId xmlns:p14="http://schemas.microsoft.com/office/powerpoint/2010/main" val="3668936883"/>
       </p:ext>
     </p:extLst>
   </p:cSld>
@@ -7246,7 +7125,7 @@
           <p:cNvPr id="2" name="Title 1">
             <a:extLst>
               <a:ext uri="{FF2B5EF4-FFF2-40B4-BE49-F238E27FC236}">
-                <a16:creationId xmlns:a16="http://schemas.microsoft.com/office/drawing/2014/main" id="{DE145FAA-0A8B-4223-92F0-99F6663BB194}"/>
+                <a16:creationId xmlns:a16="http://schemas.microsoft.com/office/drawing/2014/main" id="{62171CD2-55A0-451A-A0C4-260D0D7ABF93}"/>
               </a:ext>
             </a:extLst>
           </p:cNvPr>
@@ -7264,7 +7143,7 @@
           <a:p>
             <a:r>
               <a:rPr lang="en-GB" dirty="0"/>
-              <a:t>Ansible</a:t>
+              <a:t>Docker</a:t>
             </a:r>
           </a:p>
         </p:txBody>
@@ -7274,7 +7153,7 @@
           <p:cNvPr id="3" name="Content Placeholder 2">
             <a:extLst>
               <a:ext uri="{FF2B5EF4-FFF2-40B4-BE49-F238E27FC236}">
-                <a16:creationId xmlns:a16="http://schemas.microsoft.com/office/drawing/2014/main" id="{D1C250E1-E5E1-4EB7-8853-CCE96F445B0F}"/>
+                <a16:creationId xmlns:a16="http://schemas.microsoft.com/office/drawing/2014/main" id="{4524D04E-5135-4276-AC66-00852B84FEE3}"/>
               </a:ext>
             </a:extLst>
           </p:cNvPr>
@@ -7292,7 +7171,7 @@
           <a:p>
             <a:r>
               <a:rPr lang="en-GB" dirty="0"/>
-              <a:t>Used to automate work throughout the infrastructure.</a:t>
+              <a:t>Container management software.</a:t>
             </a:r>
           </a:p>
           <a:p>
@@ -7301,7 +7180,7 @@
           <a:p>
             <a:r>
               <a:rPr lang="en-GB" dirty="0"/>
-              <a:t>Invaluable to a system admin.</a:t>
+              <a:t>Used to create images, and containers.</a:t>
             </a:r>
           </a:p>
           <a:p>
@@ -7310,15 +7189,24 @@
           <a:p>
             <a:r>
               <a:rPr lang="en-GB" dirty="0"/>
-              <a:t>We specifically used the </a:t>
+              <a:t>Uses </a:t>
             </a:r>
             <a:r>
               <a:rPr lang="en-GB" dirty="0" err="1"/>
-              <a:t>playbook.yaml</a:t>
+              <a:t>dockerfiles</a:t>
             </a:r>
             <a:r>
               <a:rPr lang="en-GB" dirty="0"/>
-              <a:t>.</a:t>
+              <a:t> to automate this</a:t>
+            </a:r>
+          </a:p>
+          <a:p>
+            <a:endParaRPr lang="en-GB" dirty="0"/>
+          </a:p>
+          <a:p>
+            <a:r>
+              <a:rPr lang="en-GB" dirty="0"/>
+              <a:t>We’ve used Docker to create and use images.</a:t>
             </a:r>
           </a:p>
         </p:txBody>
@@ -7326,7 +7214,7 @@
     </p:spTree>
     <p:extLst>
       <p:ext uri="{BB962C8B-B14F-4D97-AF65-F5344CB8AC3E}">
-        <p14:creationId xmlns:p14="http://schemas.microsoft.com/office/powerpoint/2010/main" val="1427349912"/>
+        <p14:creationId xmlns:p14="http://schemas.microsoft.com/office/powerpoint/2010/main" val="906818953"/>
       </p:ext>
     </p:extLst>
   </p:cSld>
@@ -7358,7 +7246,7 @@
           <p:cNvPr id="2" name="Title 1">
             <a:extLst>
               <a:ext uri="{FF2B5EF4-FFF2-40B4-BE49-F238E27FC236}">
-                <a16:creationId xmlns:a16="http://schemas.microsoft.com/office/drawing/2014/main" id="{B5BC447E-D230-4420-8BEB-3FE19BC90CB5}"/>
+                <a16:creationId xmlns:a16="http://schemas.microsoft.com/office/drawing/2014/main" id="{6C390089-8495-41FB-82C9-CE1508830F4C}"/>
               </a:ext>
             </a:extLst>
           </p:cNvPr>
@@ -7376,7 +7264,7 @@
           <a:p>
             <a:r>
               <a:rPr lang="en-GB" dirty="0"/>
-              <a:t>Terraform</a:t>
+              <a:t>Docker Swarm</a:t>
             </a:r>
           </a:p>
         </p:txBody>
@@ -7386,7 +7274,7 @@
           <p:cNvPr id="3" name="Content Placeholder 2">
             <a:extLst>
               <a:ext uri="{FF2B5EF4-FFF2-40B4-BE49-F238E27FC236}">
-                <a16:creationId xmlns:a16="http://schemas.microsoft.com/office/drawing/2014/main" id="{8BE9E527-27DA-487C-86CF-AF9BF86C4DD1}"/>
+                <a16:creationId xmlns:a16="http://schemas.microsoft.com/office/drawing/2014/main" id="{29FB5573-5E07-4080-B530-772B5BA80F8B}"/>
               </a:ext>
             </a:extLst>
           </p:cNvPr>
@@ -7402,14 +7290,35 @@
           <a:bodyPr/>
           <a:lstStyle/>
           <a:p>
+            <a:r>
+              <a:rPr lang="en-GB" dirty="0"/>
+              <a:t>Docker swarm allows for multiple containers across multiple hosts.</a:t>
+            </a:r>
+          </a:p>
+          <a:p>
             <a:endParaRPr lang="en-GB" dirty="0"/>
+          </a:p>
+          <a:p>
+            <a:r>
+              <a:rPr lang="en-GB" dirty="0"/>
+              <a:t>Means that rolling updates can be applied.</a:t>
+            </a:r>
+          </a:p>
+          <a:p>
+            <a:endParaRPr lang="en-GB" dirty="0"/>
+          </a:p>
+          <a:p>
+            <a:r>
+              <a:rPr lang="en-GB" dirty="0"/>
+              <a:t>We have used it for that purpose.</a:t>
+            </a:r>
           </a:p>
         </p:txBody>
       </p:sp>
     </p:spTree>
     <p:extLst>
       <p:ext uri="{BB962C8B-B14F-4D97-AF65-F5344CB8AC3E}">
-        <p14:creationId xmlns:p14="http://schemas.microsoft.com/office/powerpoint/2010/main" val="3668936883"/>
+        <p14:creationId xmlns:p14="http://schemas.microsoft.com/office/powerpoint/2010/main" val="1793294166"/>
       </p:ext>
     </p:extLst>
   </p:cSld>

</xml_diff>

<commit_message>
Ammended the risk assessment slides and script
</commit_message>
<xml_diff>
--- a/Presentation.pptx
+++ b/Presentation.pptx
@@ -7,15 +7,17 @@
   <p:sldIdLst>
     <p:sldId id="256" r:id="rId2"/>
     <p:sldId id="257" r:id="rId3"/>
-    <p:sldId id="269" r:id="rId4"/>
-    <p:sldId id="261" r:id="rId5"/>
-    <p:sldId id="262" r:id="rId6"/>
-    <p:sldId id="263" r:id="rId7"/>
-    <p:sldId id="264" r:id="rId8"/>
-    <p:sldId id="265" r:id="rId9"/>
-    <p:sldId id="266" r:id="rId10"/>
-    <p:sldId id="268" r:id="rId11"/>
-    <p:sldId id="267" r:id="rId12"/>
+    <p:sldId id="270" r:id="rId4"/>
+    <p:sldId id="271" r:id="rId5"/>
+    <p:sldId id="269" r:id="rId6"/>
+    <p:sldId id="261" r:id="rId7"/>
+    <p:sldId id="262" r:id="rId8"/>
+    <p:sldId id="263" r:id="rId9"/>
+    <p:sldId id="264" r:id="rId10"/>
+    <p:sldId id="265" r:id="rId11"/>
+    <p:sldId id="266" r:id="rId12"/>
+    <p:sldId id="268" r:id="rId13"/>
+    <p:sldId id="267" r:id="rId14"/>
   </p:sldIdLst>
   <p:sldSz cx="12192000" cy="6858000"/>
   <p:notesSz cx="6858000" cy="9144000"/>
@@ -121,6 +123,8 @@
           <p14:sldIdLst>
             <p14:sldId id="256"/>
             <p14:sldId id="257"/>
+            <p14:sldId id="270"/>
+            <p14:sldId id="271"/>
             <p14:sldId id="269"/>
             <p14:sldId id="261"/>
             <p14:sldId id="262"/>
@@ -6232,6 +6236,231 @@
           <p:cNvPr id="2" name="Title 1">
             <a:extLst>
               <a:ext uri="{FF2B5EF4-FFF2-40B4-BE49-F238E27FC236}">
+                <a16:creationId xmlns:a16="http://schemas.microsoft.com/office/drawing/2014/main" id="{62171CD2-55A0-451A-A0C4-260D0D7ABF93}"/>
+              </a:ext>
+            </a:extLst>
+          </p:cNvPr>
+          <p:cNvSpPr>
+            <a:spLocks noGrp="1"/>
+          </p:cNvSpPr>
+          <p:nvPr>
+            <p:ph type="title"/>
+          </p:nvPr>
+        </p:nvSpPr>
+        <p:spPr/>
+        <p:txBody>
+          <a:bodyPr/>
+          <a:lstStyle/>
+          <a:p>
+            <a:r>
+              <a:rPr lang="en-GB" dirty="0"/>
+              <a:t>Docker</a:t>
+            </a:r>
+          </a:p>
+        </p:txBody>
+      </p:sp>
+      <p:sp>
+        <p:nvSpPr>
+          <p:cNvPr id="3" name="Content Placeholder 2">
+            <a:extLst>
+              <a:ext uri="{FF2B5EF4-FFF2-40B4-BE49-F238E27FC236}">
+                <a16:creationId xmlns:a16="http://schemas.microsoft.com/office/drawing/2014/main" id="{4524D04E-5135-4276-AC66-00852B84FEE3}"/>
+              </a:ext>
+            </a:extLst>
+          </p:cNvPr>
+          <p:cNvSpPr>
+            <a:spLocks noGrp="1"/>
+          </p:cNvSpPr>
+          <p:nvPr>
+            <p:ph idx="1"/>
+          </p:nvPr>
+        </p:nvSpPr>
+        <p:spPr/>
+        <p:txBody>
+          <a:bodyPr/>
+          <a:lstStyle/>
+          <a:p>
+            <a:r>
+              <a:rPr lang="en-GB" dirty="0"/>
+              <a:t>Container management software.</a:t>
+            </a:r>
+          </a:p>
+          <a:p>
+            <a:endParaRPr lang="en-GB" dirty="0"/>
+          </a:p>
+          <a:p>
+            <a:r>
+              <a:rPr lang="en-GB" dirty="0"/>
+              <a:t>Used to create images, and containers.</a:t>
+            </a:r>
+          </a:p>
+          <a:p>
+            <a:endParaRPr lang="en-GB" dirty="0"/>
+          </a:p>
+          <a:p>
+            <a:r>
+              <a:rPr lang="en-GB" dirty="0"/>
+              <a:t>Uses </a:t>
+            </a:r>
+            <a:r>
+              <a:rPr lang="en-GB" dirty="0" err="1"/>
+              <a:t>dockerfiles</a:t>
+            </a:r>
+            <a:r>
+              <a:rPr lang="en-GB" dirty="0"/>
+              <a:t> to automate this</a:t>
+            </a:r>
+          </a:p>
+          <a:p>
+            <a:endParaRPr lang="en-GB" dirty="0"/>
+          </a:p>
+          <a:p>
+            <a:r>
+              <a:rPr lang="en-GB" dirty="0"/>
+              <a:t>We’ve used Docker to create and use images.</a:t>
+            </a:r>
+          </a:p>
+        </p:txBody>
+      </p:sp>
+    </p:spTree>
+    <p:extLst>
+      <p:ext uri="{BB962C8B-B14F-4D97-AF65-F5344CB8AC3E}">
+        <p14:creationId xmlns:p14="http://schemas.microsoft.com/office/powerpoint/2010/main" val="906818953"/>
+      </p:ext>
+    </p:extLst>
+  </p:cSld>
+  <p:clrMapOvr>
+    <a:masterClrMapping/>
+  </p:clrMapOvr>
+</p:sld>
+</file>
+
+<file path=ppt/slides/slide11.xml><?xml version="1.0" encoding="utf-8"?>
+<p:sld xmlns:a="http://schemas.openxmlformats.org/drawingml/2006/main" xmlns:r="http://schemas.openxmlformats.org/officeDocument/2006/relationships" xmlns:p="http://schemas.openxmlformats.org/presentationml/2006/main">
+  <p:cSld>
+    <p:spTree>
+      <p:nvGrpSpPr>
+        <p:cNvPr id="1" name=""/>
+        <p:cNvGrpSpPr/>
+        <p:nvPr/>
+      </p:nvGrpSpPr>
+      <p:grpSpPr>
+        <a:xfrm>
+          <a:off x="0" y="0"/>
+          <a:ext cx="0" cy="0"/>
+          <a:chOff x="0" y="0"/>
+          <a:chExt cx="0" cy="0"/>
+        </a:xfrm>
+      </p:grpSpPr>
+      <p:sp>
+        <p:nvSpPr>
+          <p:cNvPr id="2" name="Title 1">
+            <a:extLst>
+              <a:ext uri="{FF2B5EF4-FFF2-40B4-BE49-F238E27FC236}">
+                <a16:creationId xmlns:a16="http://schemas.microsoft.com/office/drawing/2014/main" id="{6C390089-8495-41FB-82C9-CE1508830F4C}"/>
+              </a:ext>
+            </a:extLst>
+          </p:cNvPr>
+          <p:cNvSpPr>
+            <a:spLocks noGrp="1"/>
+          </p:cNvSpPr>
+          <p:nvPr>
+            <p:ph type="title"/>
+          </p:nvPr>
+        </p:nvSpPr>
+        <p:spPr/>
+        <p:txBody>
+          <a:bodyPr/>
+          <a:lstStyle/>
+          <a:p>
+            <a:r>
+              <a:rPr lang="en-GB" dirty="0"/>
+              <a:t>Docker Swarm</a:t>
+            </a:r>
+          </a:p>
+        </p:txBody>
+      </p:sp>
+      <p:sp>
+        <p:nvSpPr>
+          <p:cNvPr id="3" name="Content Placeholder 2">
+            <a:extLst>
+              <a:ext uri="{FF2B5EF4-FFF2-40B4-BE49-F238E27FC236}">
+                <a16:creationId xmlns:a16="http://schemas.microsoft.com/office/drawing/2014/main" id="{29FB5573-5E07-4080-B530-772B5BA80F8B}"/>
+              </a:ext>
+            </a:extLst>
+          </p:cNvPr>
+          <p:cNvSpPr>
+            <a:spLocks noGrp="1"/>
+          </p:cNvSpPr>
+          <p:nvPr>
+            <p:ph idx="1"/>
+          </p:nvPr>
+        </p:nvSpPr>
+        <p:spPr/>
+        <p:txBody>
+          <a:bodyPr/>
+          <a:lstStyle/>
+          <a:p>
+            <a:r>
+              <a:rPr lang="en-GB" dirty="0"/>
+              <a:t>Docker swarm allows for multiple containers across multiple hosts.</a:t>
+            </a:r>
+          </a:p>
+          <a:p>
+            <a:endParaRPr lang="en-GB" dirty="0"/>
+          </a:p>
+          <a:p>
+            <a:r>
+              <a:rPr lang="en-GB" dirty="0"/>
+              <a:t>Means that rolling updates can be applied.</a:t>
+            </a:r>
+          </a:p>
+          <a:p>
+            <a:endParaRPr lang="en-GB" dirty="0"/>
+          </a:p>
+          <a:p>
+            <a:r>
+              <a:rPr lang="en-GB" dirty="0"/>
+              <a:t>We have used it for that purpose.</a:t>
+            </a:r>
+          </a:p>
+        </p:txBody>
+      </p:sp>
+    </p:spTree>
+    <p:extLst>
+      <p:ext uri="{BB962C8B-B14F-4D97-AF65-F5344CB8AC3E}">
+        <p14:creationId xmlns:p14="http://schemas.microsoft.com/office/powerpoint/2010/main" val="1793294166"/>
+      </p:ext>
+    </p:extLst>
+  </p:cSld>
+  <p:clrMapOvr>
+    <a:masterClrMapping/>
+  </p:clrMapOvr>
+</p:sld>
+</file>
+
+<file path=ppt/slides/slide12.xml><?xml version="1.0" encoding="utf-8"?>
+<p:sld xmlns:a="http://schemas.openxmlformats.org/drawingml/2006/main" xmlns:r="http://schemas.openxmlformats.org/officeDocument/2006/relationships" xmlns:p="http://schemas.openxmlformats.org/presentationml/2006/main">
+  <p:cSld>
+    <p:spTree>
+      <p:nvGrpSpPr>
+        <p:cNvPr id="1" name=""/>
+        <p:cNvGrpSpPr/>
+        <p:nvPr/>
+      </p:nvGrpSpPr>
+      <p:grpSpPr>
+        <a:xfrm>
+          <a:off x="0" y="0"/>
+          <a:ext cx="0" cy="0"/>
+          <a:chOff x="0" y="0"/>
+          <a:chExt cx="0" cy="0"/>
+        </a:xfrm>
+      </p:grpSpPr>
+      <p:sp>
+        <p:nvSpPr>
+          <p:cNvPr id="2" name="Title 1">
+            <a:extLst>
+              <a:ext uri="{FF2B5EF4-FFF2-40B4-BE49-F238E27FC236}">
                 <a16:creationId xmlns:a16="http://schemas.microsoft.com/office/drawing/2014/main" id="{2F797ECE-8A43-4314-9A4F-51D8DBF73C90}"/>
               </a:ext>
             </a:extLst>
@@ -6328,7 +6557,7 @@
 </p:sld>
 </file>
 
-<file path=ppt/slides/slide11.xml><?xml version="1.0" encoding="utf-8"?>
+<file path=ppt/slides/slide13.xml><?xml version="1.0" encoding="utf-8"?>
 <p:sld xmlns:a="http://schemas.openxmlformats.org/drawingml/2006/main" xmlns:r="http://schemas.openxmlformats.org/officeDocument/2006/relationships" xmlns:p="http://schemas.openxmlformats.org/presentationml/2006/main">
   <p:cSld>
     <p:spTree>
@@ -6456,68 +6685,35 @@
           </a:p>
         </p:txBody>
       </p:sp>
-      <p:sp>
-        <p:nvSpPr>
-          <p:cNvPr id="3" name="Content Placeholder 2">
+      <p:pic>
+        <p:nvPicPr>
+          <p:cNvPr id="8" name="Content Placeholder 7">
             <a:extLst>
               <a:ext uri="{FF2B5EF4-FFF2-40B4-BE49-F238E27FC236}">
-                <a16:creationId xmlns:a16="http://schemas.microsoft.com/office/drawing/2014/main" id="{9D5CE03F-218D-457E-AC25-994541CC4C6D}"/>
+                <a16:creationId xmlns:a16="http://schemas.microsoft.com/office/drawing/2014/main" id="{9A9ECE25-4E64-4A33-8AC2-70B5B334CB10}"/>
               </a:ext>
             </a:extLst>
           </p:cNvPr>
-          <p:cNvSpPr>
-            <a:spLocks noGrp="1"/>
-          </p:cNvSpPr>
+          <p:cNvPicPr>
+            <a:picLocks noGrp="1" noChangeAspect="1"/>
+          </p:cNvPicPr>
           <p:nvPr>
             <p:ph idx="1"/>
           </p:nvPr>
-        </p:nvSpPr>
-        <p:spPr/>
-        <p:txBody>
-          <a:bodyPr/>
-          <a:lstStyle/>
-          <a:p>
-            <a:r>
-              <a:rPr lang="en-GB" dirty="0"/>
-              <a:t>Lack of knowledge on the application language.</a:t>
-            </a:r>
-          </a:p>
-          <a:p>
-            <a:endParaRPr lang="en-GB" dirty="0"/>
-          </a:p>
-          <a:p>
-            <a:r>
-              <a:rPr lang="en-GB" dirty="0"/>
-              <a:t>Scope</a:t>
-            </a:r>
-          </a:p>
-          <a:p>
-            <a:pPr lvl="1"/>
-            <a:r>
-              <a:rPr lang="en-GB" dirty="0"/>
-              <a:t>MVP</a:t>
-            </a:r>
-          </a:p>
-          <a:p>
-            <a:endParaRPr lang="en-GB" dirty="0"/>
-          </a:p>
-          <a:p>
-            <a:r>
-              <a:rPr lang="en-GB" dirty="0"/>
-              <a:t>CSRF Attacks</a:t>
-            </a:r>
-          </a:p>
-          <a:p>
-            <a:endParaRPr lang="en-GB" dirty="0"/>
-          </a:p>
-          <a:p>
-            <a:r>
-              <a:rPr lang="en-GB" dirty="0"/>
-              <a:t>DDOS Attacks</a:t>
-            </a:r>
-          </a:p>
-        </p:txBody>
-      </p:sp>
+        </p:nvPicPr>
+        <p:blipFill>
+          <a:blip r:embed="rId2"/>
+          <a:stretch>
+            <a:fillRect/>
+          </a:stretch>
+        </p:blipFill>
+        <p:spPr>
+          <a:xfrm>
+            <a:off x="1704003" y="1152983"/>
+            <a:ext cx="8346831" cy="5305274"/>
+          </a:xfrm>
+        </p:spPr>
+      </p:pic>
     </p:spTree>
     <p:extLst>
       <p:ext uri="{BB962C8B-B14F-4D97-AF65-F5344CB8AC3E}">
@@ -6553,7 +6749,7 @@
           <p:cNvPr id="2" name="Title 1">
             <a:extLst>
               <a:ext uri="{FF2B5EF4-FFF2-40B4-BE49-F238E27FC236}">
-                <a16:creationId xmlns:a16="http://schemas.microsoft.com/office/drawing/2014/main" id="{000CBE4F-19E1-4C39-AC9C-6697CC8799C5}"/>
+                <a16:creationId xmlns:a16="http://schemas.microsoft.com/office/drawing/2014/main" id="{B0A4B71D-1006-4D3E-9753-EEBB026A00C6}"/>
               </a:ext>
             </a:extLst>
           </p:cNvPr>
@@ -6571,85 +6767,44 @@
           <a:p>
             <a:r>
               <a:rPr lang="en-GB" dirty="0"/>
-              <a:t>Cost of the Project</a:t>
-            </a:r>
-          </a:p>
-        </p:txBody>
-      </p:sp>
-      <p:sp>
-        <p:nvSpPr>
-          <p:cNvPr id="3" name="Content Placeholder 2">
+              <a:t>Risk Assessment cont.</a:t>
+            </a:r>
+          </a:p>
+        </p:txBody>
+      </p:sp>
+      <p:pic>
+        <p:nvPicPr>
+          <p:cNvPr id="5" name="Content Placeholder 4">
             <a:extLst>
               <a:ext uri="{FF2B5EF4-FFF2-40B4-BE49-F238E27FC236}">
-                <a16:creationId xmlns:a16="http://schemas.microsoft.com/office/drawing/2014/main" id="{4DDABE20-7C3C-4552-B615-4A9323E5AB33}"/>
+                <a16:creationId xmlns:a16="http://schemas.microsoft.com/office/drawing/2014/main" id="{4E0F5890-0D12-49F9-ACCF-1D4661CEC24D}"/>
               </a:ext>
             </a:extLst>
           </p:cNvPr>
-          <p:cNvSpPr>
-            <a:spLocks noGrp="1"/>
-          </p:cNvSpPr>
+          <p:cNvPicPr>
+            <a:picLocks noGrp="1" noChangeAspect="1"/>
+          </p:cNvPicPr>
           <p:nvPr>
             <p:ph idx="1"/>
           </p:nvPr>
-        </p:nvSpPr>
-        <p:spPr/>
-        <p:txBody>
-          <a:bodyPr/>
-          <a:lstStyle/>
-          <a:p>
-            <a:r>
-              <a:rPr lang="en-GB" dirty="0"/>
-              <a:t>Deploying the software requires at least a t2.small vm.</a:t>
-            </a:r>
-          </a:p>
-          <a:p>
-            <a:endParaRPr lang="en-GB" dirty="0"/>
-          </a:p>
-          <a:p>
-            <a:r>
-              <a:rPr lang="en-GB" dirty="0"/>
-              <a:t>T2.small machine costs £0.017 an hour.</a:t>
-            </a:r>
-          </a:p>
-          <a:p>
-            <a:pPr lvl="1"/>
-            <a:r>
-              <a:rPr lang="en-GB" dirty="0"/>
-              <a:t>£0.41 a day.</a:t>
-            </a:r>
-          </a:p>
-          <a:p>
-            <a:pPr lvl="1"/>
-            <a:r>
-              <a:rPr lang="en-GB" dirty="0"/>
-              <a:t>Roughly £12.24 a month.</a:t>
-            </a:r>
-          </a:p>
-          <a:p>
-            <a:endParaRPr lang="en-GB" dirty="0"/>
-          </a:p>
-          <a:p>
-            <a:r>
-              <a:rPr lang="en-GB" dirty="0"/>
-              <a:t>We would require 4 machines to deploy the application</a:t>
-            </a:r>
-          </a:p>
-          <a:p>
-            <a:pPr lvl="1"/>
-            <a:r>
-              <a:rPr lang="en-GB" dirty="0"/>
-              <a:t>Total maximum cost - £48.96 a month.</a:t>
-            </a:r>
-          </a:p>
-          <a:p>
-            <a:endParaRPr lang="en-GB" dirty="0"/>
-          </a:p>
-        </p:txBody>
-      </p:sp>
+        </p:nvPicPr>
+        <p:blipFill>
+          <a:blip r:embed="rId2"/>
+          <a:stretch>
+            <a:fillRect/>
+          </a:stretch>
+        </p:blipFill>
+        <p:spPr>
+          <a:xfrm>
+            <a:off x="2141166" y="1346418"/>
+            <a:ext cx="7643445" cy="5345835"/>
+          </a:xfrm>
+        </p:spPr>
+      </p:pic>
     </p:spTree>
     <p:extLst>
       <p:ext uri="{BB962C8B-B14F-4D97-AF65-F5344CB8AC3E}">
-        <p14:creationId xmlns:p14="http://schemas.microsoft.com/office/powerpoint/2010/main" val="1045269820"/>
+        <p14:creationId xmlns:p14="http://schemas.microsoft.com/office/powerpoint/2010/main" val="601678554"/>
       </p:ext>
     </p:extLst>
   </p:cSld>
@@ -6681,7 +6836,7 @@
           <p:cNvPr id="2" name="Title 1">
             <a:extLst>
               <a:ext uri="{FF2B5EF4-FFF2-40B4-BE49-F238E27FC236}">
-                <a16:creationId xmlns:a16="http://schemas.microsoft.com/office/drawing/2014/main" id="{007D5C7D-D3CF-4C75-BCE1-A32655BA5B63}"/>
+                <a16:creationId xmlns:a16="http://schemas.microsoft.com/office/drawing/2014/main" id="{FFF43804-817B-43F8-9F60-8D49C1A5C5E5}"/>
               </a:ext>
             </a:extLst>
           </p:cNvPr>
@@ -6699,61 +6854,44 @@
           <a:p>
             <a:r>
               <a:rPr lang="en-GB" dirty="0"/>
-              <a:t>AWS</a:t>
-            </a:r>
-          </a:p>
-        </p:txBody>
-      </p:sp>
-      <p:sp>
-        <p:nvSpPr>
-          <p:cNvPr id="3" name="Content Placeholder 2">
+              <a:t>Risk Assessment cont.</a:t>
+            </a:r>
+          </a:p>
+        </p:txBody>
+      </p:sp>
+      <p:pic>
+        <p:nvPicPr>
+          <p:cNvPr id="5" name="Content Placeholder 4">
             <a:extLst>
               <a:ext uri="{FF2B5EF4-FFF2-40B4-BE49-F238E27FC236}">
-                <a16:creationId xmlns:a16="http://schemas.microsoft.com/office/drawing/2014/main" id="{A0F61D77-A24C-4D43-8F9F-64C4E74C3D86}"/>
+                <a16:creationId xmlns:a16="http://schemas.microsoft.com/office/drawing/2014/main" id="{4F939186-C255-4B5E-BF75-D037DA109870}"/>
               </a:ext>
             </a:extLst>
           </p:cNvPr>
-          <p:cNvSpPr>
-            <a:spLocks noGrp="1"/>
-          </p:cNvSpPr>
+          <p:cNvPicPr>
+            <a:picLocks noGrp="1" noChangeAspect="1"/>
+          </p:cNvPicPr>
           <p:nvPr>
             <p:ph idx="1"/>
           </p:nvPr>
-        </p:nvSpPr>
-        <p:spPr/>
-        <p:txBody>
-          <a:bodyPr/>
-          <a:lstStyle/>
-          <a:p>
-            <a:r>
-              <a:rPr lang="en-GB" dirty="0"/>
-              <a:t>We used AWS to host our virtual machines.</a:t>
-            </a:r>
-          </a:p>
-          <a:p>
-            <a:endParaRPr lang="en-GB" dirty="0"/>
-          </a:p>
-          <a:p>
-            <a:r>
-              <a:rPr lang="en-GB" dirty="0"/>
-              <a:t>We installed and got the application running manually first.</a:t>
-            </a:r>
-          </a:p>
-          <a:p>
-            <a:endParaRPr lang="en-GB" dirty="0"/>
-          </a:p>
-          <a:p>
-            <a:r>
-              <a:rPr lang="en-GB" dirty="0"/>
-              <a:t>Makes for a remote site to host that is accessible to all of the developers to work on.</a:t>
-            </a:r>
-          </a:p>
-        </p:txBody>
-      </p:sp>
+        </p:nvPicPr>
+        <p:blipFill>
+          <a:blip r:embed="rId2"/>
+          <a:stretch>
+            <a:fillRect/>
+          </a:stretch>
+        </p:blipFill>
+        <p:spPr>
+          <a:xfrm>
+            <a:off x="646111" y="2359680"/>
+            <a:ext cx="10510090" cy="3286746"/>
+          </a:xfrm>
+        </p:spPr>
+      </p:pic>
     </p:spTree>
     <p:extLst>
       <p:ext uri="{BB962C8B-B14F-4D97-AF65-F5344CB8AC3E}">
-        <p14:creationId xmlns:p14="http://schemas.microsoft.com/office/powerpoint/2010/main" val="867930786"/>
+        <p14:creationId xmlns:p14="http://schemas.microsoft.com/office/powerpoint/2010/main" val="3578297738"/>
       </p:ext>
     </p:extLst>
   </p:cSld>
@@ -6785,7 +6923,7 @@
           <p:cNvPr id="2" name="Title 1">
             <a:extLst>
               <a:ext uri="{FF2B5EF4-FFF2-40B4-BE49-F238E27FC236}">
-                <a16:creationId xmlns:a16="http://schemas.microsoft.com/office/drawing/2014/main" id="{61F1532D-0793-4F84-A3FA-B3D6FCCA0FCA}"/>
+                <a16:creationId xmlns:a16="http://schemas.microsoft.com/office/drawing/2014/main" id="{000CBE4F-19E1-4C39-AC9C-6697CC8799C5}"/>
               </a:ext>
             </a:extLst>
           </p:cNvPr>
@@ -6803,7 +6941,7 @@
           <a:p>
             <a:r>
               <a:rPr lang="en-GB" dirty="0"/>
-              <a:t>Jenkins Build</a:t>
+              <a:t>Cost of the Project</a:t>
             </a:r>
           </a:p>
         </p:txBody>
@@ -6813,7 +6951,7 @@
           <p:cNvPr id="3" name="Content Placeholder 2">
             <a:extLst>
               <a:ext uri="{FF2B5EF4-FFF2-40B4-BE49-F238E27FC236}">
-                <a16:creationId xmlns:a16="http://schemas.microsoft.com/office/drawing/2014/main" id="{EE896E65-00CD-4AED-9E8D-D0940795475B}"/>
+                <a16:creationId xmlns:a16="http://schemas.microsoft.com/office/drawing/2014/main" id="{4DDABE20-7C3C-4552-B615-4A9323E5AB33}"/>
               </a:ext>
             </a:extLst>
           </p:cNvPr>
@@ -6831,7 +6969,7 @@
           <a:p>
             <a:r>
               <a:rPr lang="en-GB" dirty="0"/>
-              <a:t>Jenkins is used to automatically update the application.</a:t>
+              <a:t>Deploying the software requires at least a t2.small vm.</a:t>
             </a:r>
           </a:p>
           <a:p>
@@ -6840,7 +6978,21 @@
           <a:p>
             <a:r>
               <a:rPr lang="en-GB" dirty="0"/>
-              <a:t>Updates when commits are made to the main branch.</a:t>
+              <a:t>T2.small machine costs £0.017 an hour.</a:t>
+            </a:r>
+          </a:p>
+          <a:p>
+            <a:pPr lvl="1"/>
+            <a:r>
+              <a:rPr lang="en-GB" dirty="0"/>
+              <a:t>£0.41 a day.</a:t>
+            </a:r>
+          </a:p>
+          <a:p>
+            <a:pPr lvl="1"/>
+            <a:r>
+              <a:rPr lang="en-GB" dirty="0"/>
+              <a:t>Roughly £12.24 a month.</a:t>
             </a:r>
           </a:p>
           <a:p>
@@ -6849,11 +7001,15 @@
           <a:p>
             <a:r>
               <a:rPr lang="en-GB" dirty="0"/>
-              <a:t>Easier deployment and version control.</a:t>
-            </a:r>
-          </a:p>
-          <a:p>
-            <a:endParaRPr lang="en-GB" dirty="0"/>
+              <a:t>We would require 4 machines to deploy the application</a:t>
+            </a:r>
+          </a:p>
+          <a:p>
+            <a:pPr lvl="1"/>
+            <a:r>
+              <a:rPr lang="en-GB" dirty="0"/>
+              <a:t>Total maximum cost - £48.96 a month.</a:t>
+            </a:r>
           </a:p>
           <a:p>
             <a:endParaRPr lang="en-GB" dirty="0"/>
@@ -6863,7 +7019,7 @@
     </p:spTree>
     <p:extLst>
       <p:ext uri="{BB962C8B-B14F-4D97-AF65-F5344CB8AC3E}">
-        <p14:creationId xmlns:p14="http://schemas.microsoft.com/office/powerpoint/2010/main" val="3446547663"/>
+        <p14:creationId xmlns:p14="http://schemas.microsoft.com/office/powerpoint/2010/main" val="1045269820"/>
       </p:ext>
     </p:extLst>
   </p:cSld>
@@ -6895,7 +7051,7 @@
           <p:cNvPr id="2" name="Title 1">
             <a:extLst>
               <a:ext uri="{FF2B5EF4-FFF2-40B4-BE49-F238E27FC236}">
-                <a16:creationId xmlns:a16="http://schemas.microsoft.com/office/drawing/2014/main" id="{DE145FAA-0A8B-4223-92F0-99F6663BB194}"/>
+                <a16:creationId xmlns:a16="http://schemas.microsoft.com/office/drawing/2014/main" id="{007D5C7D-D3CF-4C75-BCE1-A32655BA5B63}"/>
               </a:ext>
             </a:extLst>
           </p:cNvPr>
@@ -6913,7 +7069,7 @@
           <a:p>
             <a:r>
               <a:rPr lang="en-GB" dirty="0"/>
-              <a:t>Ansible</a:t>
+              <a:t>AWS</a:t>
             </a:r>
           </a:p>
         </p:txBody>
@@ -6923,7 +7079,7 @@
           <p:cNvPr id="3" name="Content Placeholder 2">
             <a:extLst>
               <a:ext uri="{FF2B5EF4-FFF2-40B4-BE49-F238E27FC236}">
-                <a16:creationId xmlns:a16="http://schemas.microsoft.com/office/drawing/2014/main" id="{D1C250E1-E5E1-4EB7-8853-CCE96F445B0F}"/>
+                <a16:creationId xmlns:a16="http://schemas.microsoft.com/office/drawing/2014/main" id="{A0F61D77-A24C-4D43-8F9F-64C4E74C3D86}"/>
               </a:ext>
             </a:extLst>
           </p:cNvPr>
@@ -6941,7 +7097,7 @@
           <a:p>
             <a:r>
               <a:rPr lang="en-GB" dirty="0"/>
-              <a:t>Used to automate work throughout the infrastructure.</a:t>
+              <a:t>We used AWS to host our virtual machines.</a:t>
             </a:r>
           </a:p>
           <a:p>
@@ -6950,7 +7106,7 @@
           <a:p>
             <a:r>
               <a:rPr lang="en-GB" dirty="0"/>
-              <a:t>Invaluable to a system admin.</a:t>
+              <a:t>We installed and got the application running manually first.</a:t>
             </a:r>
           </a:p>
           <a:p>
@@ -6959,15 +7115,7 @@
           <a:p>
             <a:r>
               <a:rPr lang="en-GB" dirty="0"/>
-              <a:t>We specifically used the </a:t>
-            </a:r>
-            <a:r>
-              <a:rPr lang="en-GB" dirty="0" err="1"/>
-              <a:t>playbook.yaml</a:t>
-            </a:r>
-            <a:r>
-              <a:rPr lang="en-GB" dirty="0"/>
-              <a:t>.</a:t>
+              <a:t>Makes for a remote site to host that is accessible to all of the developers to work on.</a:t>
             </a:r>
           </a:p>
         </p:txBody>
@@ -6975,7 +7123,7 @@
     </p:spTree>
     <p:extLst>
       <p:ext uri="{BB962C8B-B14F-4D97-AF65-F5344CB8AC3E}">
-        <p14:creationId xmlns:p14="http://schemas.microsoft.com/office/powerpoint/2010/main" val="1427349912"/>
+        <p14:creationId xmlns:p14="http://schemas.microsoft.com/office/powerpoint/2010/main" val="867930786"/>
       </p:ext>
     </p:extLst>
   </p:cSld>
@@ -7007,7 +7155,7 @@
           <p:cNvPr id="2" name="Title 1">
             <a:extLst>
               <a:ext uri="{FF2B5EF4-FFF2-40B4-BE49-F238E27FC236}">
-                <a16:creationId xmlns:a16="http://schemas.microsoft.com/office/drawing/2014/main" id="{B5BC447E-D230-4420-8BEB-3FE19BC90CB5}"/>
+                <a16:creationId xmlns:a16="http://schemas.microsoft.com/office/drawing/2014/main" id="{61F1532D-0793-4F84-A3FA-B3D6FCCA0FCA}"/>
               </a:ext>
             </a:extLst>
           </p:cNvPr>
@@ -7025,7 +7173,7 @@
           <a:p>
             <a:r>
               <a:rPr lang="en-GB" dirty="0"/>
-              <a:t>Terraform</a:t>
+              <a:t>Jenkins Build</a:t>
             </a:r>
           </a:p>
         </p:txBody>
@@ -7035,7 +7183,7 @@
           <p:cNvPr id="3" name="Content Placeholder 2">
             <a:extLst>
               <a:ext uri="{FF2B5EF4-FFF2-40B4-BE49-F238E27FC236}">
-                <a16:creationId xmlns:a16="http://schemas.microsoft.com/office/drawing/2014/main" id="{8BE9E527-27DA-487C-86CF-AF9BF86C4DD1}"/>
+                <a16:creationId xmlns:a16="http://schemas.microsoft.com/office/drawing/2014/main" id="{EE896E65-00CD-4AED-9E8D-D0940795475B}"/>
               </a:ext>
             </a:extLst>
           </p:cNvPr>
@@ -7053,7 +7201,7 @@
           <a:p>
             <a:r>
               <a:rPr lang="en-GB" dirty="0"/>
-              <a:t>A tool to control infrastructure on a cloud service provider.</a:t>
+              <a:t>Jenkins is used to automatically update the application.</a:t>
             </a:r>
           </a:p>
           <a:p>
@@ -7062,7 +7210,7 @@
           <a:p>
             <a:r>
               <a:rPr lang="en-GB" dirty="0"/>
-              <a:t>Means that environments will stay up to date.</a:t>
+              <a:t>Updates when commits are made to the main branch.</a:t>
             </a:r>
           </a:p>
           <a:p>
@@ -7071,21 +7219,13 @@
           <a:p>
             <a:r>
               <a:rPr lang="en-GB" dirty="0"/>
-              <a:t>Commonly used for; multi-tier applications, software demos, disposable environments and multi-cloud deployments.</a:t>
+              <a:t>Easier deployment and version control.</a:t>
             </a:r>
           </a:p>
           <a:p>
             <a:endParaRPr lang="en-GB" dirty="0"/>
           </a:p>
           <a:p>
-            <a:r>
-              <a:rPr lang="en-GB" dirty="0"/>
-              <a:t>Used it to set up </a:t>
-            </a:r>
-            <a:r>
-              <a:rPr lang="en-GB"/>
-              <a:t>and configure our vms in AWS.</a:t>
-            </a:r>
             <a:endParaRPr lang="en-GB" dirty="0"/>
           </a:p>
         </p:txBody>
@@ -7093,7 +7233,7 @@
     </p:spTree>
     <p:extLst>
       <p:ext uri="{BB962C8B-B14F-4D97-AF65-F5344CB8AC3E}">
-        <p14:creationId xmlns:p14="http://schemas.microsoft.com/office/powerpoint/2010/main" val="3668936883"/>
+        <p14:creationId xmlns:p14="http://schemas.microsoft.com/office/powerpoint/2010/main" val="3446547663"/>
       </p:ext>
     </p:extLst>
   </p:cSld>
@@ -7125,7 +7265,7 @@
           <p:cNvPr id="2" name="Title 1">
             <a:extLst>
               <a:ext uri="{FF2B5EF4-FFF2-40B4-BE49-F238E27FC236}">
-                <a16:creationId xmlns:a16="http://schemas.microsoft.com/office/drawing/2014/main" id="{62171CD2-55A0-451A-A0C4-260D0D7ABF93}"/>
+                <a16:creationId xmlns:a16="http://schemas.microsoft.com/office/drawing/2014/main" id="{DE145FAA-0A8B-4223-92F0-99F6663BB194}"/>
               </a:ext>
             </a:extLst>
           </p:cNvPr>
@@ -7143,7 +7283,7 @@
           <a:p>
             <a:r>
               <a:rPr lang="en-GB" dirty="0"/>
-              <a:t>Docker</a:t>
+              <a:t>Ansible</a:t>
             </a:r>
           </a:p>
         </p:txBody>
@@ -7153,7 +7293,7 @@
           <p:cNvPr id="3" name="Content Placeholder 2">
             <a:extLst>
               <a:ext uri="{FF2B5EF4-FFF2-40B4-BE49-F238E27FC236}">
-                <a16:creationId xmlns:a16="http://schemas.microsoft.com/office/drawing/2014/main" id="{4524D04E-5135-4276-AC66-00852B84FEE3}"/>
+                <a16:creationId xmlns:a16="http://schemas.microsoft.com/office/drawing/2014/main" id="{D1C250E1-E5E1-4EB7-8853-CCE96F445B0F}"/>
               </a:ext>
             </a:extLst>
           </p:cNvPr>
@@ -7171,7 +7311,7 @@
           <a:p>
             <a:r>
               <a:rPr lang="en-GB" dirty="0"/>
-              <a:t>Container management software.</a:t>
+              <a:t>Used to automate work throughout the infrastructure.</a:t>
             </a:r>
           </a:p>
           <a:p>
@@ -7180,7 +7320,7 @@
           <a:p>
             <a:r>
               <a:rPr lang="en-GB" dirty="0"/>
-              <a:t>Used to create images, and containers.</a:t>
+              <a:t>Invaluable to a system admin.</a:t>
             </a:r>
           </a:p>
           <a:p>
@@ -7189,24 +7329,15 @@
           <a:p>
             <a:r>
               <a:rPr lang="en-GB" dirty="0"/>
-              <a:t>Uses </a:t>
+              <a:t>We specifically used the </a:t>
             </a:r>
             <a:r>
               <a:rPr lang="en-GB" dirty="0" err="1"/>
-              <a:t>dockerfiles</a:t>
+              <a:t>playbook.yaml</a:t>
             </a:r>
             <a:r>
               <a:rPr lang="en-GB" dirty="0"/>
-              <a:t> to automate this</a:t>
-            </a:r>
-          </a:p>
-          <a:p>
-            <a:endParaRPr lang="en-GB" dirty="0"/>
-          </a:p>
-          <a:p>
-            <a:r>
-              <a:rPr lang="en-GB" dirty="0"/>
-              <a:t>We’ve used Docker to create and use images.</a:t>
+              <a:t>.</a:t>
             </a:r>
           </a:p>
         </p:txBody>
@@ -7214,7 +7345,7 @@
     </p:spTree>
     <p:extLst>
       <p:ext uri="{BB962C8B-B14F-4D97-AF65-F5344CB8AC3E}">
-        <p14:creationId xmlns:p14="http://schemas.microsoft.com/office/powerpoint/2010/main" val="906818953"/>
+        <p14:creationId xmlns:p14="http://schemas.microsoft.com/office/powerpoint/2010/main" val="1427349912"/>
       </p:ext>
     </p:extLst>
   </p:cSld>
@@ -7246,7 +7377,7 @@
           <p:cNvPr id="2" name="Title 1">
             <a:extLst>
               <a:ext uri="{FF2B5EF4-FFF2-40B4-BE49-F238E27FC236}">
-                <a16:creationId xmlns:a16="http://schemas.microsoft.com/office/drawing/2014/main" id="{6C390089-8495-41FB-82C9-CE1508830F4C}"/>
+                <a16:creationId xmlns:a16="http://schemas.microsoft.com/office/drawing/2014/main" id="{B5BC447E-D230-4420-8BEB-3FE19BC90CB5}"/>
               </a:ext>
             </a:extLst>
           </p:cNvPr>
@@ -7264,7 +7395,7 @@
           <a:p>
             <a:r>
               <a:rPr lang="en-GB" dirty="0"/>
-              <a:t>Docker Swarm</a:t>
+              <a:t>Terraform</a:t>
             </a:r>
           </a:p>
         </p:txBody>
@@ -7274,7 +7405,7 @@
           <p:cNvPr id="3" name="Content Placeholder 2">
             <a:extLst>
               <a:ext uri="{FF2B5EF4-FFF2-40B4-BE49-F238E27FC236}">
-                <a16:creationId xmlns:a16="http://schemas.microsoft.com/office/drawing/2014/main" id="{29FB5573-5E07-4080-B530-772B5BA80F8B}"/>
+                <a16:creationId xmlns:a16="http://schemas.microsoft.com/office/drawing/2014/main" id="{8BE9E527-27DA-487C-86CF-AF9BF86C4DD1}"/>
               </a:ext>
             </a:extLst>
           </p:cNvPr>
@@ -7292,7 +7423,7 @@
           <a:p>
             <a:r>
               <a:rPr lang="en-GB" dirty="0"/>
-              <a:t>Docker swarm allows for multiple containers across multiple hosts.</a:t>
+              <a:t>A tool to control infrastructure on a cloud service provider.</a:t>
             </a:r>
           </a:p>
           <a:p>
@@ -7301,7 +7432,7 @@
           <a:p>
             <a:r>
               <a:rPr lang="en-GB" dirty="0"/>
-              <a:t>Means that rolling updates can be applied.</a:t>
+              <a:t>Means that environments will stay up to date.</a:t>
             </a:r>
           </a:p>
           <a:p>
@@ -7310,7 +7441,16 @@
           <a:p>
             <a:r>
               <a:rPr lang="en-GB" dirty="0"/>
-              <a:t>We have used it for that purpose.</a:t>
+              <a:t>Commonly used for; multi-tier applications, software demos, disposable environments and multi-cloud deployments.</a:t>
+            </a:r>
+          </a:p>
+          <a:p>
+            <a:endParaRPr lang="en-GB" dirty="0"/>
+          </a:p>
+          <a:p>
+            <a:r>
+              <a:rPr lang="en-GB" dirty="0"/>
+              <a:t>Used it to set up and configure our vms in AWS.</a:t>
             </a:r>
           </a:p>
         </p:txBody>
@@ -7318,7 +7458,7 @@
     </p:spTree>
     <p:extLst>
       <p:ext uri="{BB962C8B-B14F-4D97-AF65-F5344CB8AC3E}">
-        <p14:creationId xmlns:p14="http://schemas.microsoft.com/office/powerpoint/2010/main" val="1793294166"/>
+        <p14:creationId xmlns:p14="http://schemas.microsoft.com/office/powerpoint/2010/main" val="3668936883"/>
       </p:ext>
     </p:extLst>
   </p:cSld>

</xml_diff>

<commit_message>
ammended the terraform slide and script
</commit_message>
<xml_diff>
--- a/Presentation.pptx
+++ b/Presentation.pptx
@@ -7453,6 +7453,28 @@
               <a:t>Used it to set up and configure our vms in AWS.</a:t>
             </a:r>
           </a:p>
+          <a:p>
+            <a:endParaRPr lang="en-GB" dirty="0"/>
+          </a:p>
+          <a:p>
+            <a:r>
+              <a:rPr lang="en-GB" dirty="0"/>
+              <a:t>Outputs an </a:t>
+            </a:r>
+            <a:r>
+              <a:rPr lang="en-GB" dirty="0" err="1"/>
+              <a:t>inventory.yaml</a:t>
+            </a:r>
+            <a:r>
+              <a:rPr lang="en-GB" dirty="0"/>
+              <a:t> containing vm </a:t>
+            </a:r>
+            <a:r>
+              <a:rPr lang="en-GB"/>
+              <a:t>IP addresses.</a:t>
+            </a:r>
+            <a:endParaRPr lang="en-GB" dirty="0"/>
+          </a:p>
         </p:txBody>
       </p:sp>
     </p:spTree>

</xml_diff>

<commit_message>
added the CI Pipeline slide - needs script writing
</commit_message>
<xml_diff>
--- a/Presentation.pptx
+++ b/Presentation.pptx
@@ -10,14 +10,15 @@
     <p:sldId id="270" r:id="rId4"/>
     <p:sldId id="271" r:id="rId5"/>
     <p:sldId id="269" r:id="rId6"/>
-    <p:sldId id="261" r:id="rId7"/>
-    <p:sldId id="262" r:id="rId8"/>
-    <p:sldId id="263" r:id="rId9"/>
-    <p:sldId id="264" r:id="rId10"/>
-    <p:sldId id="265" r:id="rId11"/>
-    <p:sldId id="266" r:id="rId12"/>
-    <p:sldId id="268" r:id="rId13"/>
-    <p:sldId id="267" r:id="rId14"/>
+    <p:sldId id="272" r:id="rId7"/>
+    <p:sldId id="261" r:id="rId8"/>
+    <p:sldId id="262" r:id="rId9"/>
+    <p:sldId id="263" r:id="rId10"/>
+    <p:sldId id="264" r:id="rId11"/>
+    <p:sldId id="265" r:id="rId12"/>
+    <p:sldId id="266" r:id="rId13"/>
+    <p:sldId id="268" r:id="rId14"/>
+    <p:sldId id="267" r:id="rId15"/>
   </p:sldIdLst>
   <p:sldSz cx="12192000" cy="6858000"/>
   <p:notesSz cx="6858000" cy="9144000"/>
@@ -126,6 +127,7 @@
             <p14:sldId id="270"/>
             <p14:sldId id="271"/>
             <p14:sldId id="269"/>
+            <p14:sldId id="272"/>
             <p14:sldId id="261"/>
             <p14:sldId id="262"/>
             <p14:sldId id="263"/>
@@ -6236,7 +6238,7 @@
           <p:cNvPr id="2" name="Title 1">
             <a:extLst>
               <a:ext uri="{FF2B5EF4-FFF2-40B4-BE49-F238E27FC236}">
-                <a16:creationId xmlns:a16="http://schemas.microsoft.com/office/drawing/2014/main" id="{62171CD2-55A0-451A-A0C4-260D0D7ABF93}"/>
+                <a16:creationId xmlns:a16="http://schemas.microsoft.com/office/drawing/2014/main" id="{B5BC447E-D230-4420-8BEB-3FE19BC90CB5}"/>
               </a:ext>
             </a:extLst>
           </p:cNvPr>
@@ -6254,7 +6256,7 @@
           <a:p>
             <a:r>
               <a:rPr lang="en-GB" dirty="0"/>
-              <a:t>Docker</a:t>
+              <a:t>Terraform</a:t>
             </a:r>
           </a:p>
         </p:txBody>
@@ -6264,7 +6266,7 @@
           <p:cNvPr id="3" name="Content Placeholder 2">
             <a:extLst>
               <a:ext uri="{FF2B5EF4-FFF2-40B4-BE49-F238E27FC236}">
-                <a16:creationId xmlns:a16="http://schemas.microsoft.com/office/drawing/2014/main" id="{4524D04E-5135-4276-AC66-00852B84FEE3}"/>
+                <a16:creationId xmlns:a16="http://schemas.microsoft.com/office/drawing/2014/main" id="{8BE9E527-27DA-487C-86CF-AF9BF86C4DD1}"/>
               </a:ext>
             </a:extLst>
           </p:cNvPr>
@@ -6282,7 +6284,7 @@
           <a:p>
             <a:r>
               <a:rPr lang="en-GB" dirty="0"/>
-              <a:t>Container management software.</a:t>
+              <a:t>A tool to control infrastructure on a cloud service provider.</a:t>
             </a:r>
           </a:p>
           <a:p>
@@ -6291,7 +6293,7 @@
           <a:p>
             <a:r>
               <a:rPr lang="en-GB" dirty="0"/>
-              <a:t>Used to create images, and containers.</a:t>
+              <a:t>Means that environments will stay up to date.</a:t>
             </a:r>
           </a:p>
           <a:p>
@@ -6300,24 +6302,33 @@
           <a:p>
             <a:r>
               <a:rPr lang="en-GB" dirty="0"/>
-              <a:t>Uses </a:t>
+              <a:t>Commonly used for; multi-tier applications, software demos, disposable environments and multi-cloud deployments.</a:t>
+            </a:r>
+          </a:p>
+          <a:p>
+            <a:endParaRPr lang="en-GB" dirty="0"/>
+          </a:p>
+          <a:p>
+            <a:r>
+              <a:rPr lang="en-GB" dirty="0"/>
+              <a:t>Used it to set up and configure our vms in AWS.</a:t>
+            </a:r>
+          </a:p>
+          <a:p>
+            <a:endParaRPr lang="en-GB" dirty="0"/>
+          </a:p>
+          <a:p>
+            <a:r>
+              <a:rPr lang="en-GB" dirty="0"/>
+              <a:t>Outputs an </a:t>
             </a:r>
             <a:r>
               <a:rPr lang="en-GB" dirty="0" err="1"/>
-              <a:t>dockerfiles</a:t>
+              <a:t>inventory.yaml</a:t>
             </a:r>
             <a:r>
               <a:rPr lang="en-GB" dirty="0"/>
-              <a:t> to automate this</a:t>
-            </a:r>
-          </a:p>
-          <a:p>
-            <a:endParaRPr lang="en-GB" dirty="0"/>
-          </a:p>
-          <a:p>
-            <a:r>
-              <a:rPr lang="en-GB" dirty="0"/>
-              <a:t>We’ve used Docker to create and use images.</a:t>
+              <a:t> containing vm IP addresses.</a:t>
             </a:r>
           </a:p>
         </p:txBody>
@@ -6325,7 +6336,7 @@
     </p:spTree>
     <p:extLst>
       <p:ext uri="{BB962C8B-B14F-4D97-AF65-F5344CB8AC3E}">
-        <p14:creationId xmlns:p14="http://schemas.microsoft.com/office/powerpoint/2010/main" val="906818953"/>
+        <p14:creationId xmlns:p14="http://schemas.microsoft.com/office/powerpoint/2010/main" val="3668936883"/>
       </p:ext>
     </p:extLst>
   </p:cSld>
@@ -6357,7 +6368,7 @@
           <p:cNvPr id="2" name="Title 1">
             <a:extLst>
               <a:ext uri="{FF2B5EF4-FFF2-40B4-BE49-F238E27FC236}">
-                <a16:creationId xmlns:a16="http://schemas.microsoft.com/office/drawing/2014/main" id="{6C390089-8495-41FB-82C9-CE1508830F4C}"/>
+                <a16:creationId xmlns:a16="http://schemas.microsoft.com/office/drawing/2014/main" id="{62171CD2-55A0-451A-A0C4-260D0D7ABF93}"/>
               </a:ext>
             </a:extLst>
           </p:cNvPr>
@@ -6375,7 +6386,7 @@
           <a:p>
             <a:r>
               <a:rPr lang="en-GB" dirty="0"/>
-              <a:t>Docker Swarm</a:t>
+              <a:t>Docker</a:t>
             </a:r>
           </a:p>
         </p:txBody>
@@ -6385,7 +6396,7 @@
           <p:cNvPr id="3" name="Content Placeholder 2">
             <a:extLst>
               <a:ext uri="{FF2B5EF4-FFF2-40B4-BE49-F238E27FC236}">
-                <a16:creationId xmlns:a16="http://schemas.microsoft.com/office/drawing/2014/main" id="{29FB5573-5E07-4080-B530-772B5BA80F8B}"/>
+                <a16:creationId xmlns:a16="http://schemas.microsoft.com/office/drawing/2014/main" id="{4524D04E-5135-4276-AC66-00852B84FEE3}"/>
               </a:ext>
             </a:extLst>
           </p:cNvPr>
@@ -6403,7 +6414,7 @@
           <a:p>
             <a:r>
               <a:rPr lang="en-GB" dirty="0"/>
-              <a:t>Docker swarm allows for multiple containers across multiple hosts.</a:t>
+              <a:t>Container management software.</a:t>
             </a:r>
           </a:p>
           <a:p>
@@ -6412,7 +6423,7 @@
           <a:p>
             <a:r>
               <a:rPr lang="en-GB" dirty="0"/>
-              <a:t>Means that rolling updates can be applied.</a:t>
+              <a:t>Used to create images, and containers.</a:t>
             </a:r>
           </a:p>
           <a:p>
@@ -6421,7 +6432,24 @@
           <a:p>
             <a:r>
               <a:rPr lang="en-GB" dirty="0"/>
-              <a:t>We have used it for that purpose.</a:t>
+              <a:t>Uses </a:t>
+            </a:r>
+            <a:r>
+              <a:rPr lang="en-GB" dirty="0" err="1"/>
+              <a:t>dockerfiles</a:t>
+            </a:r>
+            <a:r>
+              <a:rPr lang="en-GB" dirty="0"/>
+              <a:t> to automate this</a:t>
+            </a:r>
+          </a:p>
+          <a:p>
+            <a:endParaRPr lang="en-GB" dirty="0"/>
+          </a:p>
+          <a:p>
+            <a:r>
+              <a:rPr lang="en-GB" dirty="0"/>
+              <a:t>We’ve used Docker to create and use images.</a:t>
             </a:r>
           </a:p>
         </p:txBody>
@@ -6429,7 +6457,7 @@
     </p:spTree>
     <p:extLst>
       <p:ext uri="{BB962C8B-B14F-4D97-AF65-F5344CB8AC3E}">
-        <p14:creationId xmlns:p14="http://schemas.microsoft.com/office/powerpoint/2010/main" val="1793294166"/>
+        <p14:creationId xmlns:p14="http://schemas.microsoft.com/office/powerpoint/2010/main" val="906818953"/>
       </p:ext>
     </p:extLst>
   </p:cSld>
@@ -6461,6 +6489,110 @@
           <p:cNvPr id="2" name="Title 1">
             <a:extLst>
               <a:ext uri="{FF2B5EF4-FFF2-40B4-BE49-F238E27FC236}">
+                <a16:creationId xmlns:a16="http://schemas.microsoft.com/office/drawing/2014/main" id="{6C390089-8495-41FB-82C9-CE1508830F4C}"/>
+              </a:ext>
+            </a:extLst>
+          </p:cNvPr>
+          <p:cNvSpPr>
+            <a:spLocks noGrp="1"/>
+          </p:cNvSpPr>
+          <p:nvPr>
+            <p:ph type="title"/>
+          </p:nvPr>
+        </p:nvSpPr>
+        <p:spPr/>
+        <p:txBody>
+          <a:bodyPr/>
+          <a:lstStyle/>
+          <a:p>
+            <a:r>
+              <a:rPr lang="en-GB" dirty="0"/>
+              <a:t>Docker Swarm</a:t>
+            </a:r>
+          </a:p>
+        </p:txBody>
+      </p:sp>
+      <p:sp>
+        <p:nvSpPr>
+          <p:cNvPr id="3" name="Content Placeholder 2">
+            <a:extLst>
+              <a:ext uri="{FF2B5EF4-FFF2-40B4-BE49-F238E27FC236}">
+                <a16:creationId xmlns:a16="http://schemas.microsoft.com/office/drawing/2014/main" id="{29FB5573-5E07-4080-B530-772B5BA80F8B}"/>
+              </a:ext>
+            </a:extLst>
+          </p:cNvPr>
+          <p:cNvSpPr>
+            <a:spLocks noGrp="1"/>
+          </p:cNvSpPr>
+          <p:nvPr>
+            <p:ph idx="1"/>
+          </p:nvPr>
+        </p:nvSpPr>
+        <p:spPr/>
+        <p:txBody>
+          <a:bodyPr/>
+          <a:lstStyle/>
+          <a:p>
+            <a:r>
+              <a:rPr lang="en-GB" dirty="0"/>
+              <a:t>Docker swarm allows for multiple containers across multiple hosts.</a:t>
+            </a:r>
+          </a:p>
+          <a:p>
+            <a:endParaRPr lang="en-GB" dirty="0"/>
+          </a:p>
+          <a:p>
+            <a:r>
+              <a:rPr lang="en-GB" dirty="0"/>
+              <a:t>Means that rolling updates can be applied.</a:t>
+            </a:r>
+          </a:p>
+          <a:p>
+            <a:endParaRPr lang="en-GB" dirty="0"/>
+          </a:p>
+          <a:p>
+            <a:r>
+              <a:rPr lang="en-GB" dirty="0"/>
+              <a:t>We have used it for that purpose.</a:t>
+            </a:r>
+          </a:p>
+        </p:txBody>
+      </p:sp>
+    </p:spTree>
+    <p:extLst>
+      <p:ext uri="{BB962C8B-B14F-4D97-AF65-F5344CB8AC3E}">
+        <p14:creationId xmlns:p14="http://schemas.microsoft.com/office/powerpoint/2010/main" val="1793294166"/>
+      </p:ext>
+    </p:extLst>
+  </p:cSld>
+  <p:clrMapOvr>
+    <a:masterClrMapping/>
+  </p:clrMapOvr>
+</p:sld>
+</file>
+
+<file path=ppt/slides/slide13.xml><?xml version="1.0" encoding="utf-8"?>
+<p:sld xmlns:a="http://schemas.openxmlformats.org/drawingml/2006/main" xmlns:r="http://schemas.openxmlformats.org/officeDocument/2006/relationships" xmlns:p="http://schemas.openxmlformats.org/presentationml/2006/main">
+  <p:cSld>
+    <p:spTree>
+      <p:nvGrpSpPr>
+        <p:cNvPr id="1" name=""/>
+        <p:cNvGrpSpPr/>
+        <p:nvPr/>
+      </p:nvGrpSpPr>
+      <p:grpSpPr>
+        <a:xfrm>
+          <a:off x="0" y="0"/>
+          <a:ext cx="0" cy="0"/>
+          <a:chOff x="0" y="0"/>
+          <a:chExt cx="0" cy="0"/>
+        </a:xfrm>
+      </p:grpSpPr>
+      <p:sp>
+        <p:nvSpPr>
+          <p:cNvPr id="2" name="Title 1">
+            <a:extLst>
+              <a:ext uri="{FF2B5EF4-FFF2-40B4-BE49-F238E27FC236}">
                 <a16:creationId xmlns:a16="http://schemas.microsoft.com/office/drawing/2014/main" id="{2F797ECE-8A43-4314-9A4F-51D8DBF73C90}"/>
               </a:ext>
             </a:extLst>
@@ -6557,7 +6689,7 @@
 </p:sld>
 </file>
 
-<file path=ppt/slides/slide13.xml><?xml version="1.0" encoding="utf-8"?>
+<file path=ppt/slides/slide14.xml><?xml version="1.0" encoding="utf-8"?>
 <p:sld xmlns:a="http://schemas.openxmlformats.org/drawingml/2006/main" xmlns:r="http://schemas.openxmlformats.org/officeDocument/2006/relationships" xmlns:p="http://schemas.openxmlformats.org/presentationml/2006/main">
   <p:cSld>
     <p:spTree>
@@ -7051,7 +7183,7 @@
           <p:cNvPr id="2" name="Title 1">
             <a:extLst>
               <a:ext uri="{FF2B5EF4-FFF2-40B4-BE49-F238E27FC236}">
-                <a16:creationId xmlns:a16="http://schemas.microsoft.com/office/drawing/2014/main" id="{007D5C7D-D3CF-4C75-BCE1-A32655BA5B63}"/>
+                <a16:creationId xmlns:a16="http://schemas.microsoft.com/office/drawing/2014/main" id="{649C9783-9E4B-46A8-8505-60A54D6F578D}"/>
               </a:ext>
             </a:extLst>
           </p:cNvPr>
@@ -7069,7 +7201,7 @@
           <a:p>
             <a:r>
               <a:rPr lang="en-GB" dirty="0"/>
-              <a:t>AWS</a:t>
+              <a:t>CI Pipeline</a:t>
             </a:r>
           </a:p>
         </p:txBody>
@@ -7079,7 +7211,7 @@
           <p:cNvPr id="3" name="Content Placeholder 2">
             <a:extLst>
               <a:ext uri="{FF2B5EF4-FFF2-40B4-BE49-F238E27FC236}">
-                <a16:creationId xmlns:a16="http://schemas.microsoft.com/office/drawing/2014/main" id="{A0F61D77-A24C-4D43-8F9F-64C4E74C3D86}"/>
+                <a16:creationId xmlns:a16="http://schemas.microsoft.com/office/drawing/2014/main" id="{D0C7EE23-886A-43D2-B214-76CD17BBA464}"/>
               </a:ext>
             </a:extLst>
           </p:cNvPr>
@@ -7095,35 +7227,14 @@
           <a:bodyPr/>
           <a:lstStyle/>
           <a:p>
-            <a:r>
-              <a:rPr lang="en-GB" dirty="0"/>
-              <a:t>We used AWS to host our virtual machines.</a:t>
-            </a:r>
-          </a:p>
-          <a:p>
             <a:endParaRPr lang="en-GB" dirty="0"/>
-          </a:p>
-          <a:p>
-            <a:r>
-              <a:rPr lang="en-GB" dirty="0"/>
-              <a:t>We installed and got the application running manually first.</a:t>
-            </a:r>
-          </a:p>
-          <a:p>
-            <a:endParaRPr lang="en-GB" dirty="0"/>
-          </a:p>
-          <a:p>
-            <a:r>
-              <a:rPr lang="en-GB" dirty="0"/>
-              <a:t>Makes for a remote site to host that is accessible to all of the developers to work on.</a:t>
-            </a:r>
           </a:p>
         </p:txBody>
       </p:sp>
     </p:spTree>
     <p:extLst>
       <p:ext uri="{BB962C8B-B14F-4D97-AF65-F5344CB8AC3E}">
-        <p14:creationId xmlns:p14="http://schemas.microsoft.com/office/powerpoint/2010/main" val="867930786"/>
+        <p14:creationId xmlns:p14="http://schemas.microsoft.com/office/powerpoint/2010/main" val="2718940606"/>
       </p:ext>
     </p:extLst>
   </p:cSld>
@@ -7155,7 +7266,7 @@
           <p:cNvPr id="2" name="Title 1">
             <a:extLst>
               <a:ext uri="{FF2B5EF4-FFF2-40B4-BE49-F238E27FC236}">
-                <a16:creationId xmlns:a16="http://schemas.microsoft.com/office/drawing/2014/main" id="{61F1532D-0793-4F84-A3FA-B3D6FCCA0FCA}"/>
+                <a16:creationId xmlns:a16="http://schemas.microsoft.com/office/drawing/2014/main" id="{007D5C7D-D3CF-4C75-BCE1-A32655BA5B63}"/>
               </a:ext>
             </a:extLst>
           </p:cNvPr>
@@ -7173,7 +7284,7 @@
           <a:p>
             <a:r>
               <a:rPr lang="en-GB" dirty="0"/>
-              <a:t>Jenkins Build</a:t>
+              <a:t>AWS</a:t>
             </a:r>
           </a:p>
         </p:txBody>
@@ -7183,7 +7294,7 @@
           <p:cNvPr id="3" name="Content Placeholder 2">
             <a:extLst>
               <a:ext uri="{FF2B5EF4-FFF2-40B4-BE49-F238E27FC236}">
-                <a16:creationId xmlns:a16="http://schemas.microsoft.com/office/drawing/2014/main" id="{EE896E65-00CD-4AED-9E8D-D0940795475B}"/>
+                <a16:creationId xmlns:a16="http://schemas.microsoft.com/office/drawing/2014/main" id="{A0F61D77-A24C-4D43-8F9F-64C4E74C3D86}"/>
               </a:ext>
             </a:extLst>
           </p:cNvPr>
@@ -7201,7 +7312,7 @@
           <a:p>
             <a:r>
               <a:rPr lang="en-GB" dirty="0"/>
-              <a:t>Jenkins is used to automatically update the application.</a:t>
+              <a:t>We used AWS to host our virtual machines.</a:t>
             </a:r>
           </a:p>
           <a:p>
@@ -7210,7 +7321,7 @@
           <a:p>
             <a:r>
               <a:rPr lang="en-GB" dirty="0"/>
-              <a:t>Updates when commits are made to the main branch.</a:t>
+              <a:t>We installed and got the application running manually first.</a:t>
             </a:r>
           </a:p>
           <a:p>
@@ -7219,21 +7330,15 @@
           <a:p>
             <a:r>
               <a:rPr lang="en-GB" dirty="0"/>
-              <a:t>Easier deployment and version control.</a:t>
-            </a:r>
-          </a:p>
-          <a:p>
-            <a:endParaRPr lang="en-GB" dirty="0"/>
-          </a:p>
-          <a:p>
-            <a:endParaRPr lang="en-GB" dirty="0"/>
+              <a:t>Makes for a remote site to host that is accessible to all of the developers to work on.</a:t>
+            </a:r>
           </a:p>
         </p:txBody>
       </p:sp>
     </p:spTree>
     <p:extLst>
       <p:ext uri="{BB962C8B-B14F-4D97-AF65-F5344CB8AC3E}">
-        <p14:creationId xmlns:p14="http://schemas.microsoft.com/office/powerpoint/2010/main" val="3446547663"/>
+        <p14:creationId xmlns:p14="http://schemas.microsoft.com/office/powerpoint/2010/main" val="867930786"/>
       </p:ext>
     </p:extLst>
   </p:cSld>
@@ -7265,7 +7370,7 @@
           <p:cNvPr id="2" name="Title 1">
             <a:extLst>
               <a:ext uri="{FF2B5EF4-FFF2-40B4-BE49-F238E27FC236}">
-                <a16:creationId xmlns:a16="http://schemas.microsoft.com/office/drawing/2014/main" id="{DE145FAA-0A8B-4223-92F0-99F6663BB194}"/>
+                <a16:creationId xmlns:a16="http://schemas.microsoft.com/office/drawing/2014/main" id="{61F1532D-0793-4F84-A3FA-B3D6FCCA0FCA}"/>
               </a:ext>
             </a:extLst>
           </p:cNvPr>
@@ -7283,7 +7388,7 @@
           <a:p>
             <a:r>
               <a:rPr lang="en-GB" dirty="0"/>
-              <a:t>Ansible</a:t>
+              <a:t>Jenkins Build</a:t>
             </a:r>
           </a:p>
         </p:txBody>
@@ -7293,7 +7398,7 @@
           <p:cNvPr id="3" name="Content Placeholder 2">
             <a:extLst>
               <a:ext uri="{FF2B5EF4-FFF2-40B4-BE49-F238E27FC236}">
-                <a16:creationId xmlns:a16="http://schemas.microsoft.com/office/drawing/2014/main" id="{D1C250E1-E5E1-4EB7-8853-CCE96F445B0F}"/>
+                <a16:creationId xmlns:a16="http://schemas.microsoft.com/office/drawing/2014/main" id="{EE896E65-00CD-4AED-9E8D-D0940795475B}"/>
               </a:ext>
             </a:extLst>
           </p:cNvPr>
@@ -7311,7 +7416,7 @@
           <a:p>
             <a:r>
               <a:rPr lang="en-GB" dirty="0"/>
-              <a:t>Used to automate work throughout the infrastructure.</a:t>
+              <a:t>Jenkins is used to automatically update the application.</a:t>
             </a:r>
           </a:p>
           <a:p>
@@ -7320,7 +7425,7 @@
           <a:p>
             <a:r>
               <a:rPr lang="en-GB" dirty="0"/>
-              <a:t>Invaluable to a system admin.</a:t>
+              <a:t>Updates when commits are made to the main branch.</a:t>
             </a:r>
           </a:p>
           <a:p>
@@ -7329,23 +7434,21 @@
           <a:p>
             <a:r>
               <a:rPr lang="en-GB" dirty="0"/>
-              <a:t>We specifically used the </a:t>
-            </a:r>
-            <a:r>
-              <a:rPr lang="en-GB" dirty="0" err="1"/>
-              <a:t>playbook.yaml</a:t>
-            </a:r>
-            <a:r>
-              <a:rPr lang="en-GB" dirty="0"/>
-              <a:t>.</a:t>
-            </a:r>
+              <a:t>Easier deployment and version control.</a:t>
+            </a:r>
+          </a:p>
+          <a:p>
+            <a:endParaRPr lang="en-GB" dirty="0"/>
+          </a:p>
+          <a:p>
+            <a:endParaRPr lang="en-GB" dirty="0"/>
           </a:p>
         </p:txBody>
       </p:sp>
     </p:spTree>
     <p:extLst>
       <p:ext uri="{BB962C8B-B14F-4D97-AF65-F5344CB8AC3E}">
-        <p14:creationId xmlns:p14="http://schemas.microsoft.com/office/powerpoint/2010/main" val="1427349912"/>
+        <p14:creationId xmlns:p14="http://schemas.microsoft.com/office/powerpoint/2010/main" val="3446547663"/>
       </p:ext>
     </p:extLst>
   </p:cSld>
@@ -7377,7 +7480,7 @@
           <p:cNvPr id="2" name="Title 1">
             <a:extLst>
               <a:ext uri="{FF2B5EF4-FFF2-40B4-BE49-F238E27FC236}">
-                <a16:creationId xmlns:a16="http://schemas.microsoft.com/office/drawing/2014/main" id="{B5BC447E-D230-4420-8BEB-3FE19BC90CB5}"/>
+                <a16:creationId xmlns:a16="http://schemas.microsoft.com/office/drawing/2014/main" id="{DE145FAA-0A8B-4223-92F0-99F6663BB194}"/>
               </a:ext>
             </a:extLst>
           </p:cNvPr>
@@ -7395,7 +7498,7 @@
           <a:p>
             <a:r>
               <a:rPr lang="en-GB" dirty="0"/>
-              <a:t>Terraform</a:t>
+              <a:t>Ansible</a:t>
             </a:r>
           </a:p>
         </p:txBody>
@@ -7405,7 +7508,7 @@
           <p:cNvPr id="3" name="Content Placeholder 2">
             <a:extLst>
               <a:ext uri="{FF2B5EF4-FFF2-40B4-BE49-F238E27FC236}">
-                <a16:creationId xmlns:a16="http://schemas.microsoft.com/office/drawing/2014/main" id="{8BE9E527-27DA-487C-86CF-AF9BF86C4DD1}"/>
+                <a16:creationId xmlns:a16="http://schemas.microsoft.com/office/drawing/2014/main" id="{D1C250E1-E5E1-4EB7-8853-CCE96F445B0F}"/>
               </a:ext>
             </a:extLst>
           </p:cNvPr>
@@ -7423,7 +7526,7 @@
           <a:p>
             <a:r>
               <a:rPr lang="en-GB" dirty="0"/>
-              <a:t>A tool to control infrastructure on a cloud service provider.</a:t>
+              <a:t>Used to automate work throughout the infrastructure.</a:t>
             </a:r>
           </a:p>
           <a:p>
@@ -7432,7 +7535,7 @@
           <a:p>
             <a:r>
               <a:rPr lang="en-GB" dirty="0"/>
-              <a:t>Means that environments will stay up to date.</a:t>
+              <a:t>Invaluable to a system admin.</a:t>
             </a:r>
           </a:p>
           <a:p>
@@ -7441,46 +7544,23 @@
           <a:p>
             <a:r>
               <a:rPr lang="en-GB" dirty="0"/>
-              <a:t>Commonly used for; multi-tier applications, software demos, disposable environments and multi-cloud deployments.</a:t>
-            </a:r>
-          </a:p>
-          <a:p>
-            <a:endParaRPr lang="en-GB" dirty="0"/>
-          </a:p>
-          <a:p>
+              <a:t>We specifically used the </a:t>
+            </a:r>
+            <a:r>
+              <a:rPr lang="en-GB" dirty="0" err="1"/>
+              <a:t>playbook.yaml</a:t>
+            </a:r>
             <a:r>
               <a:rPr lang="en-GB" dirty="0"/>
-              <a:t>Used it to set up and configure our vms in AWS.</a:t>
-            </a:r>
-          </a:p>
-          <a:p>
-            <a:endParaRPr lang="en-GB" dirty="0"/>
-          </a:p>
-          <a:p>
-            <a:r>
-              <a:rPr lang="en-GB" dirty="0"/>
-              <a:t>Outputs an </a:t>
-            </a:r>
-            <a:r>
-              <a:rPr lang="en-GB" dirty="0" err="1"/>
-              <a:t>inventory.yaml</a:t>
-            </a:r>
-            <a:r>
-              <a:rPr lang="en-GB" dirty="0"/>
-              <a:t> containing vm </a:t>
-            </a:r>
-            <a:r>
-              <a:rPr lang="en-GB"/>
-              <a:t>IP addresses.</a:t>
-            </a:r>
-            <a:endParaRPr lang="en-GB" dirty="0"/>
+              <a:t>.</a:t>
+            </a:r>
           </a:p>
         </p:txBody>
       </p:sp>
     </p:spTree>
     <p:extLst>
       <p:ext uri="{BB962C8B-B14F-4D97-AF65-F5344CB8AC3E}">
-        <p14:creationId xmlns:p14="http://schemas.microsoft.com/office/powerpoint/2010/main" val="3668936883"/>
+        <p14:creationId xmlns:p14="http://schemas.microsoft.com/office/powerpoint/2010/main" val="1427349912"/>
       </p:ext>
     </p:extLst>
   </p:cSld>

</xml_diff>

<commit_message>
Added the script to the CI Pipeline and completed the presentation
</commit_message>
<xml_diff>
--- a/Presentation.pptx
+++ b/Presentation.pptx
@@ -7206,31 +7206,41 @@
           </a:p>
         </p:txBody>
       </p:sp>
-      <p:sp>
-        <p:nvSpPr>
-          <p:cNvPr id="3" name="Content Placeholder 2">
+      <p:pic>
+        <p:nvPicPr>
+          <p:cNvPr id="5" name="Content Placeholder 4" descr="Diagram, timeline&#10;&#10;Description automatically generated">
             <a:extLst>
               <a:ext uri="{FF2B5EF4-FFF2-40B4-BE49-F238E27FC236}">
-                <a16:creationId xmlns:a16="http://schemas.microsoft.com/office/drawing/2014/main" id="{D0C7EE23-886A-43D2-B214-76CD17BBA464}"/>
+                <a16:creationId xmlns:a16="http://schemas.microsoft.com/office/drawing/2014/main" id="{4E7ACBAD-2FB7-4683-B8CC-27918B6E9C40}"/>
               </a:ext>
             </a:extLst>
           </p:cNvPr>
-          <p:cNvSpPr>
-            <a:spLocks noGrp="1"/>
-          </p:cNvSpPr>
+          <p:cNvPicPr>
+            <a:picLocks noGrp="1" noChangeAspect="1"/>
+          </p:cNvPicPr>
           <p:nvPr>
             <p:ph idx="1"/>
           </p:nvPr>
-        </p:nvSpPr>
-        <p:spPr/>
-        <p:txBody>
-          <a:bodyPr/>
-          <a:lstStyle/>
-          <a:p>
-            <a:endParaRPr lang="en-GB" dirty="0"/>
-          </a:p>
-        </p:txBody>
-      </p:sp>
+        </p:nvPicPr>
+        <p:blipFill>
+          <a:blip r:embed="rId2">
+            <a:extLst>
+              <a:ext uri="{28A0092B-C50C-407E-A947-70E740481C1C}">
+                <a14:useLocalDpi xmlns:a14="http://schemas.microsoft.com/office/drawing/2010/main" val="0"/>
+              </a:ext>
+            </a:extLst>
+          </a:blip>
+          <a:stretch>
+            <a:fillRect/>
+          </a:stretch>
+        </p:blipFill>
+        <p:spPr>
+          <a:xfrm>
+            <a:off x="2805598" y="1197812"/>
+            <a:ext cx="6580803" cy="5386177"/>
+          </a:xfrm>
+        </p:spPr>
+      </p:pic>
     </p:spTree>
     <p:extLst>
       <p:ext uri="{BB962C8B-B14F-4D97-AF65-F5344CB8AC3E}">

</xml_diff>